<commit_message>
Ultime modifiche alla presentazione
</commit_message>
<xml_diff>
--- a/Monopoly.pptx
+++ b/Monopoly.pptx
@@ -6,16 +6,15 @@
   </p:sldMasterIdLst>
   <p:sldIdLst>
     <p:sldId id="256" r:id="rId2"/>
-    <p:sldId id="260" r:id="rId3"/>
-    <p:sldId id="267" r:id="rId4"/>
-    <p:sldId id="258" r:id="rId5"/>
-    <p:sldId id="259" r:id="rId6"/>
-    <p:sldId id="261" r:id="rId7"/>
-    <p:sldId id="262" r:id="rId8"/>
-    <p:sldId id="263" r:id="rId9"/>
-    <p:sldId id="264" r:id="rId10"/>
-    <p:sldId id="265" r:id="rId11"/>
-    <p:sldId id="266" r:id="rId12"/>
+    <p:sldId id="267" r:id="rId3"/>
+    <p:sldId id="258" r:id="rId4"/>
+    <p:sldId id="259" r:id="rId5"/>
+    <p:sldId id="261" r:id="rId6"/>
+    <p:sldId id="262" r:id="rId7"/>
+    <p:sldId id="263" r:id="rId8"/>
+    <p:sldId id="264" r:id="rId9"/>
+    <p:sldId id="265" r:id="rId10"/>
+    <p:sldId id="266" r:id="rId11"/>
   </p:sldIdLst>
   <p:sldSz cx="12192000" cy="6858000"/>
   <p:notesSz cx="6858000" cy="9144000"/>
@@ -273,7 +272,7 @@
           <a:p>
             <a:fld id="{326951E3-958F-4611-B170-D081BA0250F9}" type="datetimeFigureOut">
               <a:rPr lang="en-US" smtClean="0"/>
-              <a:t>12/5/2023</a:t>
+              <a:t>12/6/2023</a:t>
             </a:fld>
             <a:endParaRPr lang="en-US"/>
           </a:p>
@@ -471,7 +470,7 @@
           <a:p>
             <a:fld id="{326951E3-958F-4611-B170-D081BA0250F9}" type="datetimeFigureOut">
               <a:rPr lang="en-US" smtClean="0"/>
-              <a:t>12/5/2023</a:t>
+              <a:t>12/6/2023</a:t>
             </a:fld>
             <a:endParaRPr lang="en-US"/>
           </a:p>
@@ -679,7 +678,7 @@
           <a:p>
             <a:fld id="{326951E3-958F-4611-B170-D081BA0250F9}" type="datetimeFigureOut">
               <a:rPr lang="en-US" smtClean="0"/>
-              <a:t>12/5/2023</a:t>
+              <a:t>12/6/2023</a:t>
             </a:fld>
             <a:endParaRPr lang="en-US"/>
           </a:p>
@@ -877,7 +876,7 @@
           <a:p>
             <a:fld id="{326951E3-958F-4611-B170-D081BA0250F9}" type="datetimeFigureOut">
               <a:rPr lang="en-US" smtClean="0"/>
-              <a:t>12/5/2023</a:t>
+              <a:t>12/6/2023</a:t>
             </a:fld>
             <a:endParaRPr lang="en-US"/>
           </a:p>
@@ -1154,7 +1153,7 @@
           <a:p>
             <a:fld id="{326951E3-958F-4611-B170-D081BA0250F9}" type="datetimeFigureOut">
               <a:rPr lang="en-US" smtClean="0"/>
-              <a:t>12/5/2023</a:t>
+              <a:t>12/6/2023</a:t>
             </a:fld>
             <a:endParaRPr lang="en-US"/>
           </a:p>
@@ -1419,7 +1418,7 @@
           <a:p>
             <a:fld id="{326951E3-958F-4611-B170-D081BA0250F9}" type="datetimeFigureOut">
               <a:rPr lang="en-US" smtClean="0"/>
-              <a:t>12/5/2023</a:t>
+              <a:t>12/6/2023</a:t>
             </a:fld>
             <a:endParaRPr lang="en-US"/>
           </a:p>
@@ -1841,7 +1840,7 @@
           <a:p>
             <a:fld id="{326951E3-958F-4611-B170-D081BA0250F9}" type="datetimeFigureOut">
               <a:rPr lang="en-US" smtClean="0"/>
-              <a:t>12/5/2023</a:t>
+              <a:t>12/6/2023</a:t>
             </a:fld>
             <a:endParaRPr lang="en-US"/>
           </a:p>
@@ -1993,7 +1992,7 @@
           <a:p>
             <a:fld id="{326951E3-958F-4611-B170-D081BA0250F9}" type="datetimeFigureOut">
               <a:rPr lang="en-US" smtClean="0"/>
-              <a:t>12/5/2023</a:t>
+              <a:t>12/6/2023</a:t>
             </a:fld>
             <a:endParaRPr lang="en-US"/>
           </a:p>
@@ -2106,7 +2105,7 @@
           <a:p>
             <a:fld id="{326951E3-958F-4611-B170-D081BA0250F9}" type="datetimeFigureOut">
               <a:rPr lang="en-US" smtClean="0"/>
-              <a:t>12/5/2023</a:t>
+              <a:t>12/6/2023</a:t>
             </a:fld>
             <a:endParaRPr lang="en-US"/>
           </a:p>
@@ -2424,7 +2423,7 @@
           <a:p>
             <a:fld id="{326951E3-958F-4611-B170-D081BA0250F9}" type="datetimeFigureOut">
               <a:rPr lang="en-US" smtClean="0"/>
-              <a:t>12/5/2023</a:t>
+              <a:t>12/6/2023</a:t>
             </a:fld>
             <a:endParaRPr lang="en-US"/>
           </a:p>
@@ -2760,7 +2759,7 @@
           <a:p>
             <a:fld id="{326951E3-958F-4611-B170-D081BA0250F9}" type="datetimeFigureOut">
               <a:rPr lang="en-US" smtClean="0"/>
-              <a:t>12/5/2023</a:t>
+              <a:t>12/6/2023</a:t>
             </a:fld>
             <a:endParaRPr lang="en-US"/>
           </a:p>
@@ -3049,7 +3048,7 @@
             <a:fld id="{326951E3-958F-4611-B170-D081BA0250F9}" type="datetimeFigureOut">
               <a:rPr lang="en-US" smtClean="0"/>
               <a:pPr/>
-              <a:t>12/5/2023</a:t>
+              <a:t>12/6/2023</a:t>
             </a:fld>
             <a:endParaRPr lang="en-US" dirty="0"/>
           </a:p>
@@ -3889,296 +3888,9 @@
     <p:bg>
       <p:bgPr>
         <a:solidFill>
-          <a:schemeClr val="bg2"/>
-        </a:solidFill>
-        <a:effectLst/>
-      </p:bgPr>
-    </p:bg>
-    <p:spTree>
-      <p:nvGrpSpPr>
-        <p:cNvPr id="1" name=""/>
-        <p:cNvGrpSpPr/>
-        <p:nvPr/>
-      </p:nvGrpSpPr>
-      <p:grpSpPr>
-        <a:xfrm>
-          <a:off x="0" y="0"/>
-          <a:ext cx="0" cy="0"/>
-          <a:chOff x="0" y="0"/>
-          <a:chExt cx="0" cy="0"/>
-        </a:xfrm>
-      </p:grpSpPr>
-      <p:sp useBgFill="1">
-        <p:nvSpPr>
-          <p:cNvPr id="12" name="Rectangle 11">
-            <a:extLst>
-              <a:ext uri="{FF2B5EF4-FFF2-40B4-BE49-F238E27FC236}">
-                <a16:creationId xmlns:a16="http://schemas.microsoft.com/office/drawing/2014/main" id="{BF02845A-8571-40C5-9F56-8F9B3F7C4E4C}"/>
-              </a:ext>
-              <a:ext uri="{C183D7F6-B498-43B3-948B-1728B52AA6E4}">
-                <adec:decorative xmlns:adec="http://schemas.microsoft.com/office/drawing/2017/decorative" val="1"/>
-              </a:ext>
-            </a:extLst>
-          </p:cNvPr>
-          <p:cNvSpPr>
-            <a:spLocks noGrp="1" noRot="1" noChangeAspect="1" noMove="1" noResize="1" noEditPoints="1" noAdjustHandles="1" noChangeArrowheads="1" noChangeShapeType="1" noTextEdit="1"/>
-          </p:cNvSpPr>
-          <p:nvPr>
-            <p:extLst>
-              <p:ext uri="{386F3935-93C4-4BCD-93E2-E3B085C9AB24}">
-                <p16:designElem xmlns:p16="http://schemas.microsoft.com/office/powerpoint/2015/main" val="1"/>
-              </p:ext>
-            </p:extLst>
-          </p:nvPr>
-        </p:nvSpPr>
-        <p:spPr>
-          <a:xfrm>
-            <a:off x="0" y="0"/>
-            <a:ext cx="12192000" cy="6858000"/>
-          </a:xfrm>
-          <a:prstGeom prst="rect">
-            <a:avLst/>
-          </a:prstGeom>
-          <a:ln w="12700" cap="flat" cmpd="sng" algn="ctr">
-            <a:noFill/>
-            <a:prstDash val="solid"/>
-            <a:miter lim="800000"/>
-          </a:ln>
-          <a:effectLst/>
-          <a:extLst>
-            <a:ext uri="{91240B29-F687-4F45-9708-019B960494DF}">
-              <a14:hiddenLine xmlns:a14="http://schemas.microsoft.com/office/drawing/2010/main" w="12700" cap="flat" cmpd="sng" algn="ctr">
-                <a:solidFill>
-                  <a:schemeClr val="accent1">
-                    <a:shade val="50000"/>
-                  </a:schemeClr>
-                </a:solidFill>
-                <a:prstDash val="solid"/>
-                <a:miter lim="800000"/>
-              </a14:hiddenLine>
-            </a:ext>
-          </a:extLst>
-        </p:spPr>
-        <p:style>
-          <a:lnRef idx="2">
-            <a:schemeClr val="accent1">
-              <a:shade val="50000"/>
-            </a:schemeClr>
-          </a:lnRef>
-          <a:fillRef idx="1">
-            <a:schemeClr val="accent1"/>
-          </a:fillRef>
-          <a:effectRef idx="0">
-            <a:schemeClr val="accent1"/>
-          </a:effectRef>
-          <a:fontRef idx="minor">
-            <a:schemeClr val="lt1"/>
-          </a:fontRef>
-        </p:style>
-        <p:txBody>
-          <a:bodyPr rtlCol="0" anchor="ctr"/>
-          <a:lstStyle/>
-          <a:p>
-            <a:pPr algn="ctr"/>
-            <a:endParaRPr lang="en-US"/>
-          </a:p>
-        </p:txBody>
-      </p:sp>
-      <p:sp>
-        <p:nvSpPr>
-          <p:cNvPr id="2" name="Titolo 1">
-            <a:extLst>
-              <a:ext uri="{FF2B5EF4-FFF2-40B4-BE49-F238E27FC236}">
-                <a16:creationId xmlns:a16="http://schemas.microsoft.com/office/drawing/2014/main" id="{3799425E-88AC-9A32-5961-19DA0155272E}"/>
-              </a:ext>
-            </a:extLst>
-          </p:cNvPr>
-          <p:cNvSpPr>
-            <a:spLocks noGrp="1"/>
-          </p:cNvSpPr>
-          <p:nvPr>
-            <p:ph type="title"/>
-          </p:nvPr>
-        </p:nvSpPr>
-        <p:spPr>
-          <a:xfrm>
-            <a:off x="3811296" y="-281566"/>
-            <a:ext cx="4569407" cy="1560083"/>
-          </a:xfrm>
-        </p:spPr>
-        <p:txBody>
-          <a:bodyPr>
-            <a:normAutofit/>
-          </a:bodyPr>
-          <a:lstStyle/>
-          <a:p>
-            <a:pPr algn="ctr"/>
-            <a:r>
-              <a:rPr lang="en-US" dirty="0"/>
-              <a:t>Class diagram</a:t>
-            </a:r>
-            <a:endParaRPr lang="it-IT" dirty="0"/>
-          </a:p>
-        </p:txBody>
-      </p:sp>
-      <p:cxnSp>
-        <p:nvCxnSpPr>
-          <p:cNvPr id="14" name="Straight Connector 13">
-            <a:extLst>
-              <a:ext uri="{FF2B5EF4-FFF2-40B4-BE49-F238E27FC236}">
-                <a16:creationId xmlns:a16="http://schemas.microsoft.com/office/drawing/2014/main" id="{F30BB598-81B4-41BB-BC44-CD9C29AE2EAB}"/>
-              </a:ext>
-              <a:ext uri="{C183D7F6-B498-43B3-948B-1728B52AA6E4}">
-                <adec:decorative xmlns:adec="http://schemas.microsoft.com/office/drawing/2017/decorative" val="1"/>
-              </a:ext>
-            </a:extLst>
-          </p:cNvPr>
-          <p:cNvCxnSpPr>
-            <a:cxnSpLocks noGrp="1" noRot="1" noChangeAspect="1" noMove="1" noResize="1" noEditPoints="1" noAdjustHandles="1" noChangeArrowheads="1" noChangeShapeType="1"/>
-          </p:cNvCxnSpPr>
-          <p:nvPr>
-            <p:extLst>
-              <p:ext uri="{386F3935-93C4-4BCD-93E2-E3B085C9AB24}">
-                <p16:designElem xmlns:p16="http://schemas.microsoft.com/office/powerpoint/2015/main" val="1"/>
-              </p:ext>
-            </p:extLst>
-          </p:nvPr>
-        </p:nvCxnSpPr>
-        <p:spPr>
-          <a:xfrm>
-            <a:off x="952500" y="2871627"/>
-            <a:ext cx="0" cy="3186701"/>
-          </a:xfrm>
-          <a:prstGeom prst="line">
-            <a:avLst/>
-          </a:prstGeom>
-          <a:ln w="10795">
-            <a:solidFill>
-              <a:schemeClr val="tx2"/>
-            </a:solidFill>
-          </a:ln>
-        </p:spPr>
-        <p:style>
-          <a:lnRef idx="1">
-            <a:schemeClr val="accent1"/>
-          </a:lnRef>
-          <a:fillRef idx="0">
-            <a:schemeClr val="accent1"/>
-          </a:fillRef>
-          <a:effectRef idx="0">
-            <a:schemeClr val="accent1"/>
-          </a:effectRef>
-          <a:fontRef idx="minor">
-            <a:schemeClr val="tx1"/>
-          </a:fontRef>
-        </p:style>
-      </p:cxnSp>
-      <p:pic>
-        <p:nvPicPr>
-          <p:cNvPr id="7" name="Immagine 6">
-            <a:extLst>
-              <a:ext uri="{FF2B5EF4-FFF2-40B4-BE49-F238E27FC236}">
-                <a16:creationId xmlns:a16="http://schemas.microsoft.com/office/drawing/2014/main" id="{BCCEC2DF-6D72-B889-A1C8-56C55E15F7A6}"/>
-              </a:ext>
-            </a:extLst>
-          </p:cNvPr>
-          <p:cNvPicPr>
-            <a:picLocks noChangeAspect="1"/>
-          </p:cNvPicPr>
-          <p:nvPr/>
-        </p:nvPicPr>
-        <p:blipFill>
-          <a:blip r:embed="rId2"/>
-          <a:stretch>
-            <a:fillRect/>
-          </a:stretch>
-        </p:blipFill>
-        <p:spPr>
-          <a:xfrm>
-            <a:off x="2219324" y="1506033"/>
-            <a:ext cx="7753350" cy="5124450"/>
-          </a:xfrm>
-          <a:prstGeom prst="rect">
-            <a:avLst/>
-          </a:prstGeom>
-        </p:spPr>
-      </p:pic>
-      <p:sp>
-        <p:nvSpPr>
-          <p:cNvPr id="8" name="Rettangolo 7">
-            <a:extLst>
-              <a:ext uri="{FF2B5EF4-FFF2-40B4-BE49-F238E27FC236}">
-                <a16:creationId xmlns:a16="http://schemas.microsoft.com/office/drawing/2014/main" id="{2F576475-9DAF-0113-975A-981B9110244A}"/>
-              </a:ext>
-            </a:extLst>
-          </p:cNvPr>
-          <p:cNvSpPr/>
-          <p:nvPr/>
-        </p:nvSpPr>
-        <p:spPr>
-          <a:xfrm>
-            <a:off x="660400" y="2527300"/>
-            <a:ext cx="711200" cy="3683000"/>
-          </a:xfrm>
-          <a:prstGeom prst="rect">
-            <a:avLst/>
-          </a:prstGeom>
-          <a:solidFill>
-            <a:srgbClr val="262626"/>
-          </a:solidFill>
-          <a:ln>
-            <a:solidFill>
-              <a:srgbClr val="262626"/>
-            </a:solidFill>
-          </a:ln>
-        </p:spPr>
-        <p:style>
-          <a:lnRef idx="2">
-            <a:schemeClr val="accent1">
-              <a:shade val="15000"/>
-            </a:schemeClr>
-          </a:lnRef>
-          <a:fillRef idx="1">
-            <a:schemeClr val="accent1"/>
-          </a:fillRef>
-          <a:effectRef idx="0">
-            <a:schemeClr val="accent1"/>
-          </a:effectRef>
-          <a:fontRef idx="minor">
-            <a:schemeClr val="lt1"/>
-          </a:fontRef>
-        </p:style>
-        <p:txBody>
-          <a:bodyPr rtlCol="0" anchor="ctr"/>
-          <a:lstStyle/>
-          <a:p>
-            <a:pPr algn="ctr"/>
-            <a:endParaRPr lang="it-IT"/>
-          </a:p>
-        </p:txBody>
-      </p:sp>
-    </p:spTree>
-    <p:extLst>
-      <p:ext uri="{BB962C8B-B14F-4D97-AF65-F5344CB8AC3E}">
-        <p14:creationId xmlns:p14="http://schemas.microsoft.com/office/powerpoint/2010/main" val="2878792033"/>
-      </p:ext>
-    </p:extLst>
-  </p:cSld>
-  <p:clrMapOvr>
-    <a:masterClrMapping/>
-  </p:clrMapOvr>
-</p:sld>
-</file>
-
-<file path=ppt/slides/slide11.xml><?xml version="1.0" encoding="utf-8"?>
-<p:sld xmlns:a="http://schemas.openxmlformats.org/drawingml/2006/main" xmlns:r="http://schemas.openxmlformats.org/officeDocument/2006/relationships" xmlns:p="http://schemas.openxmlformats.org/presentationml/2006/main">
-  <p:cSld>
-    <p:bg>
-      <p:bgPr>
-        <a:solidFill>
-          <a:schemeClr val="bg1">
-            <a:lumMod val="85000"/>
-            <a:lumOff val="15000"/>
+          <a:schemeClr val="bg2">
+            <a:lumMod val="75000"/>
+            <a:lumOff val="25000"/>
           </a:schemeClr>
         </a:solidFill>
         <a:effectLst/>
@@ -4521,7 +4233,10 @@
     <p:bg>
       <p:bgPr>
         <a:solidFill>
-          <a:schemeClr val="bg2"/>
+          <a:schemeClr val="bg2">
+            <a:lumMod val="75000"/>
+            <a:lumOff val="25000"/>
+          </a:schemeClr>
         </a:solidFill>
         <a:effectLst/>
       </p:bgPr>
@@ -4542,7 +4257,7 @@
       </p:grpSpPr>
       <p:cxnSp>
         <p:nvCxnSpPr>
-          <p:cNvPr id="2055" name="Straight Connector 2054">
+          <p:cNvPr id="3079" name="Straight Connector 3078">
             <a:extLst>
               <a:ext uri="{FF2B5EF4-FFF2-40B4-BE49-F238E27FC236}">
                 <a16:creationId xmlns:a16="http://schemas.microsoft.com/office/drawing/2014/main" id="{EAD4CCDA-06BF-4D2A-B44F-195AEC0B5B22}"/>
@@ -4594,10 +4309,10 @@
       </p:cxnSp>
       <p:sp useBgFill="1">
         <p:nvSpPr>
-          <p:cNvPr id="2057" name="Rectangle 2056">
-            <a:extLst>
-              <a:ext uri="{FF2B5EF4-FFF2-40B4-BE49-F238E27FC236}">
-                <a16:creationId xmlns:a16="http://schemas.microsoft.com/office/drawing/2014/main" id="{F69F96FE-C3F5-4F02-8428-78ADCB975ED9}"/>
+          <p:cNvPr id="3081" name="Rectangle 3080">
+            <a:extLst>
+              <a:ext uri="{FF2B5EF4-FFF2-40B4-BE49-F238E27FC236}">
+                <a16:creationId xmlns:a16="http://schemas.microsoft.com/office/drawing/2014/main" id="{BF02845A-8571-40C5-9F56-8F9B3F7C4E4C}"/>
               </a:ext>
               <a:ext uri="{C183D7F6-B498-43B3-948B-1728B52AA6E4}">
                 <adec:decorative xmlns:adec="http://schemas.microsoft.com/office/drawing/2017/decorative" val="1"/>
@@ -4668,66 +4383,95 @@
           </a:p>
         </p:txBody>
       </p:sp>
-      <p:pic>
-        <p:nvPicPr>
-          <p:cNvPr id="2050" name="Picture 2" descr="Che cosa è Java | Salvatore Aranzulla">
-            <a:extLst>
-              <a:ext uri="{FF2B5EF4-FFF2-40B4-BE49-F238E27FC236}">
-                <a16:creationId xmlns:a16="http://schemas.microsoft.com/office/drawing/2014/main" id="{A6958D31-820E-287A-4DF4-A61509BC37BA}"/>
-              </a:ext>
-            </a:extLst>
-          </p:cNvPr>
-          <p:cNvPicPr>
-            <a:picLocks noChangeAspect="1" noChangeArrowheads="1"/>
-          </p:cNvPicPr>
+      <p:sp>
+        <p:nvSpPr>
+          <p:cNvPr id="2" name="Titolo 1">
+            <a:extLst>
+              <a:ext uri="{FF2B5EF4-FFF2-40B4-BE49-F238E27FC236}">
+                <a16:creationId xmlns:a16="http://schemas.microsoft.com/office/drawing/2014/main" id="{31707C28-4D0F-4531-2309-2C388516F3D0}"/>
+              </a:ext>
+            </a:extLst>
+          </p:cNvPr>
+          <p:cNvSpPr txBox="1">
+            <a:spLocks/>
+          </p:cNvSpPr>
           <p:nvPr/>
-        </p:nvPicPr>
-        <p:blipFill rotWithShape="1">
-          <a:blip r:embed="rId2">
-            <a:extLst>
-              <a:ext uri="{28A0092B-C50C-407E-A947-70E740481C1C}">
-                <a14:useLocalDpi xmlns:a14="http://schemas.microsoft.com/office/drawing/2010/main" val="0"/>
-              </a:ext>
-            </a:extLst>
-          </a:blip>
-          <a:srcRect t="7938" b="19010"/>
-          <a:stretch/>
-        </p:blipFill>
-        <p:spPr bwMode="auto">
-          <a:xfrm>
-            <a:off x="21" y="-1"/>
-            <a:ext cx="12191979" cy="6858000"/>
+        </p:nvSpPr>
+        <p:spPr>
+          <a:xfrm>
+            <a:off x="764593" y="895440"/>
+            <a:ext cx="4569407" cy="1560083"/>
           </a:xfrm>
           <a:prstGeom prst="rect">
             <a:avLst/>
           </a:prstGeom>
-          <a:noFill/>
-          <a:extLst>
-            <a:ext uri="{909E8E84-426E-40DD-AFC4-6F175D3DCCD1}">
-              <a14:hiddenFill xmlns:a14="http://schemas.microsoft.com/office/drawing/2010/main">
+        </p:spPr>
+        <p:txBody>
+          <a:bodyPr vert="horz" lIns="91440" tIns="45720" rIns="91440" bIns="45720" rtlCol="0" anchor="b">
+            <a:normAutofit/>
+          </a:bodyPr>
+          <a:lstStyle>
+            <a:lvl1pPr algn="l" defTabSz="914400" rtl="0" eaLnBrk="1" latinLnBrk="0" hangingPunct="1">
+              <a:lnSpc>
+                <a:spcPct val="100000"/>
+              </a:lnSpc>
+              <a:spcBef>
+                <a:spcPct val="0"/>
+              </a:spcBef>
+              <a:buNone/>
+              <a:defRPr sz="4400" kern="1200">
                 <a:solidFill>
-                  <a:srgbClr val="FFFFFF"/>
+                  <a:schemeClr val="tx2"/>
                 </a:solidFill>
-              </a14:hiddenFill>
-            </a:ext>
-          </a:extLst>
-        </p:spPr>
-      </p:pic>
-      <p:sp>
-        <p:nvSpPr>
-          <p:cNvPr id="2059" name="Rectangle 2058">
-            <a:extLst>
-              <a:ext uri="{FF2B5EF4-FFF2-40B4-BE49-F238E27FC236}">
-                <a16:creationId xmlns:a16="http://schemas.microsoft.com/office/drawing/2014/main" id="{F80C6B76-4D7E-4FE2-84E4-C4734B2B49EE}"/>
+                <a:latin typeface="+mj-lt"/>
+                <a:ea typeface="+mj-ea"/>
+                <a:cs typeface="+mj-cs"/>
+              </a:defRPr>
+            </a:lvl1pPr>
+          </a:lstStyle>
+          <a:p>
+            <a:pPr>
+              <a:spcAft>
+                <a:spcPts val="600"/>
+              </a:spcAft>
+            </a:pPr>
+            <a:r>
+              <a:rPr lang="en-US" kern="1200" dirty="0" err="1">
+                <a:solidFill>
+                  <a:schemeClr val="tx2"/>
+                </a:solidFill>
+                <a:latin typeface="+mj-lt"/>
+                <a:ea typeface="+mj-ea"/>
+                <a:cs typeface="+mj-cs"/>
+              </a:rPr>
+              <a:t>Obiettivo</a:t>
+            </a:r>
+            <a:endParaRPr lang="en-US" kern="1200" dirty="0">
+              <a:solidFill>
+                <a:schemeClr val="tx2"/>
+              </a:solidFill>
+              <a:latin typeface="+mj-lt"/>
+              <a:ea typeface="+mj-ea"/>
+              <a:cs typeface="+mj-cs"/>
+            </a:endParaRPr>
+          </a:p>
+        </p:txBody>
+      </p:sp>
+      <p:cxnSp>
+        <p:nvCxnSpPr>
+          <p:cNvPr id="3083" name="Straight Connector 3082">
+            <a:extLst>
+              <a:ext uri="{FF2B5EF4-FFF2-40B4-BE49-F238E27FC236}">
+                <a16:creationId xmlns:a16="http://schemas.microsoft.com/office/drawing/2014/main" id="{F30BB598-81B4-41BB-BC44-CD9C29AE2EAB}"/>
               </a:ext>
               <a:ext uri="{C183D7F6-B498-43B3-948B-1728B52AA6E4}">
                 <adec:decorative xmlns:adec="http://schemas.microsoft.com/office/drawing/2017/decorative" val="1"/>
               </a:ext>
             </a:extLst>
           </p:cNvPr>
-          <p:cNvSpPr>
-            <a:spLocks noGrp="1" noRot="1" noChangeAspect="1" noMove="1" noResize="1" noEditPoints="1" noAdjustHandles="1" noChangeArrowheads="1" noChangeShapeType="1" noTextEdit="1"/>
-          </p:cNvSpPr>
+          <p:cNvCxnSpPr>
+            <a:cxnSpLocks noGrp="1" noRot="1" noChangeAspect="1" noMove="1" noResize="1" noEditPoints="1" noAdjustHandles="1" noChangeArrowheads="1" noChangeShapeType="1"/>
+          </p:cNvCxnSpPr>
           <p:nvPr>
             <p:extLst>
               <p:ext uri="{386F3935-93C4-4BCD-93E2-E3B085C9AB24}">
@@ -4735,147 +4479,18 @@
               </p:ext>
             </p:extLst>
           </p:nvPr>
-        </p:nvSpPr>
-        <p:spPr>
-          <a:xfrm flipV="1">
-            <a:off x="-2" y="1"/>
-            <a:ext cx="12191999" cy="3779457"/>
-          </a:xfrm>
-          <a:prstGeom prst="rect">
-            <a:avLst/>
-          </a:prstGeom>
-          <a:gradFill flip="none" rotWithShape="1">
-            <a:gsLst>
-              <a:gs pos="0">
-                <a:srgbClr val="000000">
-                  <a:alpha val="0"/>
-                </a:srgbClr>
-              </a:gs>
-              <a:gs pos="49000">
-                <a:srgbClr val="000000">
-                  <a:alpha val="45000"/>
-                </a:srgbClr>
-              </a:gs>
-              <a:gs pos="100000">
-                <a:srgbClr val="000000">
-                  <a:alpha val="64000"/>
-                </a:srgbClr>
-              </a:gs>
-            </a:gsLst>
-            <a:lin ang="5400000" scaled="1"/>
-            <a:tileRect/>
-          </a:gradFill>
-          <a:ln>
-            <a:noFill/>
-          </a:ln>
-        </p:spPr>
-        <p:style>
-          <a:lnRef idx="2">
-            <a:schemeClr val="accent1">
-              <a:shade val="50000"/>
-            </a:schemeClr>
-          </a:lnRef>
-          <a:fillRef idx="1">
-            <a:schemeClr val="accent1"/>
-          </a:fillRef>
-          <a:effectRef idx="0">
-            <a:schemeClr val="accent1"/>
-          </a:effectRef>
-          <a:fontRef idx="minor">
-            <a:schemeClr val="lt1"/>
-          </a:fontRef>
-        </p:style>
-        <p:txBody>
-          <a:bodyPr rtlCol="0" anchor="ctr"/>
-          <a:lstStyle/>
-          <a:p>
-            <a:pPr algn="ctr"/>
-            <a:endParaRPr lang="en-US"/>
-          </a:p>
-        </p:txBody>
-      </p:sp>
-      <p:sp>
-        <p:nvSpPr>
-          <p:cNvPr id="2" name="Titolo 1">
-            <a:extLst>
-              <a:ext uri="{FF2B5EF4-FFF2-40B4-BE49-F238E27FC236}">
-                <a16:creationId xmlns:a16="http://schemas.microsoft.com/office/drawing/2014/main" id="{FB24F5C1-2197-437E-99B5-93B586B00548}"/>
-              </a:ext>
-            </a:extLst>
-          </p:cNvPr>
-          <p:cNvSpPr>
-            <a:spLocks noGrp="1"/>
-          </p:cNvSpPr>
-          <p:nvPr>
-            <p:ph type="title"/>
-          </p:nvPr>
-        </p:nvSpPr>
-        <p:spPr>
-          <a:xfrm>
-            <a:off x="952498" y="1808740"/>
-            <a:ext cx="10447724" cy="1030880"/>
-          </a:xfrm>
-        </p:spPr>
-        <p:txBody>
-          <a:bodyPr vert="horz" lIns="91440" tIns="45720" rIns="91440" bIns="45720" rtlCol="0" anchor="b">
-            <a:normAutofit/>
-          </a:bodyPr>
-          <a:lstStyle/>
-          <a:p>
-            <a:r>
-              <a:rPr lang="en-US" sz="4800" dirty="0" err="1">
-                <a:solidFill>
-                  <a:srgbClr val="FFFFFF"/>
-                </a:solidFill>
-                <a:latin typeface="Yu Gothic" panose="020B0400000000000000" pitchFamily="34" charset="-128"/>
-                <a:ea typeface="Yu Gothic" panose="020B0400000000000000" pitchFamily="34" charset="-128"/>
-              </a:rPr>
-              <a:t>Descrizione</a:t>
-            </a:r>
-            <a:endParaRPr lang="en-US" sz="4800" dirty="0">
-              <a:solidFill>
-                <a:srgbClr val="FFFFFF"/>
-              </a:solidFill>
-              <a:latin typeface="Yu Gothic" panose="020B0400000000000000" pitchFamily="34" charset="-128"/>
-              <a:ea typeface="Yu Gothic" panose="020B0400000000000000" pitchFamily="34" charset="-128"/>
-            </a:endParaRPr>
-          </a:p>
-        </p:txBody>
-      </p:sp>
-      <p:cxnSp>
-        <p:nvCxnSpPr>
-          <p:cNvPr id="2061" name="Straight Connector 2060">
-            <a:extLst>
-              <a:ext uri="{FF2B5EF4-FFF2-40B4-BE49-F238E27FC236}">
-                <a16:creationId xmlns:a16="http://schemas.microsoft.com/office/drawing/2014/main" id="{16BEECB0-0766-4C59-B86E-5D26B7D8EF4D}"/>
-              </a:ext>
-              <a:ext uri="{C183D7F6-B498-43B3-948B-1728B52AA6E4}">
-                <adec:decorative xmlns:adec="http://schemas.microsoft.com/office/drawing/2017/decorative" val="1"/>
-              </a:ext>
-            </a:extLst>
-          </p:cNvPr>
-          <p:cNvCxnSpPr>
-            <a:cxnSpLocks noGrp="1" noRot="1" noChangeAspect="1" noMove="1" noResize="1" noEditPoints="1" noAdjustHandles="1" noChangeArrowheads="1" noChangeShapeType="1"/>
-          </p:cNvCxnSpPr>
-          <p:nvPr>
-            <p:extLst>
-              <p:ext uri="{386F3935-93C4-4BCD-93E2-E3B085C9AB24}">
-                <p16:designElem xmlns:p16="http://schemas.microsoft.com/office/powerpoint/2015/main" val="1"/>
-              </p:ext>
-            </p:extLst>
-          </p:nvPr>
         </p:nvCxnSpPr>
         <p:spPr>
           <a:xfrm>
-            <a:off x="954990" y="1808741"/>
-            <a:ext cx="10325101" cy="0"/>
+            <a:off x="952500" y="2871627"/>
+            <a:ext cx="0" cy="3186701"/>
           </a:xfrm>
           <a:prstGeom prst="line">
             <a:avLst/>
           </a:prstGeom>
           <a:ln w="10795">
             <a:solidFill>
-              <a:srgbClr val="FFFFFF"/>
+              <a:schemeClr val="tx2"/>
             </a:solidFill>
           </a:ln>
         </p:spPr>
@@ -4894,10 +4509,486 @@
           </a:fontRef>
         </p:style>
       </p:cxnSp>
+      <p:sp>
+        <p:nvSpPr>
+          <p:cNvPr id="4" name="CasellaDiTesto 3">
+            <a:extLst>
+              <a:ext uri="{FF2B5EF4-FFF2-40B4-BE49-F238E27FC236}">
+                <a16:creationId xmlns:a16="http://schemas.microsoft.com/office/drawing/2014/main" id="{DAC717A3-DE2C-9CD6-12C5-45E498EBB101}"/>
+              </a:ext>
+            </a:extLst>
+          </p:cNvPr>
+          <p:cNvSpPr txBox="1"/>
+          <p:nvPr/>
+        </p:nvSpPr>
+        <p:spPr>
+          <a:xfrm>
+            <a:off x="1570033" y="2753546"/>
+            <a:ext cx="3746928" cy="3402555"/>
+          </a:xfrm>
+          <a:prstGeom prst="rect">
+            <a:avLst/>
+          </a:prstGeom>
+        </p:spPr>
+        <p:txBody>
+          <a:bodyPr vert="horz" lIns="91440" tIns="45720" rIns="91440" bIns="45720" rtlCol="0" anchor="t">
+            <a:normAutofit/>
+          </a:bodyPr>
+          <a:lstStyle/>
+          <a:p>
+            <a:pPr>
+              <a:lnSpc>
+                <a:spcPct val="120000"/>
+              </a:lnSpc>
+              <a:spcAft>
+                <a:spcPts val="600"/>
+              </a:spcAft>
+              <a:buSzPct val="70000"/>
+            </a:pPr>
+            <a:r>
+              <a:rPr lang="en-US" dirty="0">
+                <a:solidFill>
+                  <a:schemeClr val="tx2"/>
+                </a:solidFill>
+              </a:rPr>
+              <a:t>In </a:t>
+            </a:r>
+            <a:r>
+              <a:rPr lang="en-US" dirty="0" err="1">
+                <a:solidFill>
+                  <a:schemeClr val="tx2"/>
+                </a:solidFill>
+              </a:rPr>
+              <a:t>questo</a:t>
+            </a:r>
+            <a:r>
+              <a:rPr lang="en-US" dirty="0">
+                <a:solidFill>
+                  <a:schemeClr val="tx2"/>
+                </a:solidFill>
+              </a:rPr>
+              <a:t> </a:t>
+            </a:r>
+            <a:r>
+              <a:rPr lang="en-US" dirty="0" err="1">
+                <a:solidFill>
+                  <a:schemeClr val="tx2"/>
+                </a:solidFill>
+              </a:rPr>
+              <a:t>si</a:t>
+            </a:r>
+            <a:r>
+              <a:rPr lang="en-US" dirty="0">
+                <a:solidFill>
+                  <a:schemeClr val="tx2"/>
+                </a:solidFill>
+              </a:rPr>
+              <a:t> è </a:t>
+            </a:r>
+            <a:r>
+              <a:rPr lang="en-US" dirty="0" err="1">
+                <a:solidFill>
+                  <a:schemeClr val="tx2"/>
+                </a:solidFill>
+              </a:rPr>
+              <a:t>cercato</a:t>
+            </a:r>
+            <a:r>
+              <a:rPr lang="en-US" dirty="0">
+                <a:solidFill>
+                  <a:schemeClr val="tx2"/>
+                </a:solidFill>
+              </a:rPr>
+              <a:t> di </a:t>
+            </a:r>
+            <a:r>
+              <a:rPr lang="en-US" dirty="0" err="1">
+                <a:solidFill>
+                  <a:schemeClr val="tx2"/>
+                </a:solidFill>
+              </a:rPr>
+              <a:t>realizzare</a:t>
+            </a:r>
+            <a:r>
+              <a:rPr lang="en-US" dirty="0">
+                <a:solidFill>
+                  <a:schemeClr val="tx2"/>
+                </a:solidFill>
+              </a:rPr>
+              <a:t> </a:t>
+            </a:r>
+            <a:r>
+              <a:rPr lang="en-US" dirty="0" err="1">
+                <a:solidFill>
+                  <a:schemeClr val="tx2"/>
+                </a:solidFill>
+              </a:rPr>
+              <a:t>una</a:t>
+            </a:r>
+            <a:r>
+              <a:rPr lang="en-US" dirty="0">
+                <a:solidFill>
+                  <a:schemeClr val="tx2"/>
+                </a:solidFill>
+              </a:rPr>
+              <a:t> </a:t>
+            </a:r>
+            <a:r>
+              <a:rPr lang="en-US" dirty="0" err="1">
+                <a:solidFill>
+                  <a:schemeClr val="tx2"/>
+                </a:solidFill>
+              </a:rPr>
+              <a:t>copia</a:t>
+            </a:r>
+            <a:r>
+              <a:rPr lang="en-US" dirty="0">
+                <a:solidFill>
+                  <a:schemeClr val="tx2"/>
+                </a:solidFill>
+              </a:rPr>
+              <a:t> del </a:t>
+            </a:r>
+            <a:r>
+              <a:rPr lang="en-US" dirty="0" err="1">
+                <a:solidFill>
+                  <a:schemeClr val="tx2"/>
+                </a:solidFill>
+              </a:rPr>
+              <a:t>gioco</a:t>
+            </a:r>
+            <a:r>
+              <a:rPr lang="en-US" dirty="0">
+                <a:solidFill>
+                  <a:schemeClr val="tx2"/>
+                </a:solidFill>
+              </a:rPr>
+              <a:t> da </a:t>
+            </a:r>
+            <a:r>
+              <a:rPr lang="en-US" dirty="0" err="1">
+                <a:solidFill>
+                  <a:schemeClr val="tx2"/>
+                </a:solidFill>
+              </a:rPr>
+              <a:t>tavolo</a:t>
+            </a:r>
+            <a:r>
+              <a:rPr lang="en-US" dirty="0">
+                <a:solidFill>
+                  <a:schemeClr val="tx2"/>
+                </a:solidFill>
+              </a:rPr>
+              <a:t> «Monopoly» </a:t>
+            </a:r>
+            <a:r>
+              <a:rPr lang="en-US" dirty="0" err="1">
+                <a:solidFill>
+                  <a:schemeClr val="tx2"/>
+                </a:solidFill>
+              </a:rPr>
+              <a:t>utilizzando</a:t>
+            </a:r>
+            <a:r>
+              <a:rPr lang="en-US" dirty="0">
+                <a:solidFill>
+                  <a:schemeClr val="tx2"/>
+                </a:solidFill>
+              </a:rPr>
+              <a:t> il </a:t>
+            </a:r>
+            <a:r>
+              <a:rPr lang="en-US" dirty="0" err="1">
+                <a:solidFill>
+                  <a:schemeClr val="tx2"/>
+                </a:solidFill>
+              </a:rPr>
+              <a:t>linguaggio</a:t>
+            </a:r>
+            <a:r>
+              <a:rPr lang="en-US" dirty="0">
+                <a:solidFill>
+                  <a:schemeClr val="tx2"/>
+                </a:solidFill>
+              </a:rPr>
+              <a:t> di </a:t>
+            </a:r>
+            <a:r>
+              <a:rPr lang="en-US" dirty="0" err="1">
+                <a:solidFill>
+                  <a:schemeClr val="tx2"/>
+                </a:solidFill>
+              </a:rPr>
+              <a:t>programmazione</a:t>
+            </a:r>
+            <a:r>
+              <a:rPr lang="en-US" dirty="0">
+                <a:solidFill>
+                  <a:schemeClr val="tx2"/>
+                </a:solidFill>
+              </a:rPr>
+              <a:t> Java</a:t>
+            </a:r>
+          </a:p>
+          <a:p>
+            <a:pPr>
+              <a:lnSpc>
+                <a:spcPct val="120000"/>
+              </a:lnSpc>
+              <a:spcAft>
+                <a:spcPts val="600"/>
+              </a:spcAft>
+              <a:buSzPct val="70000"/>
+            </a:pPr>
+            <a:endParaRPr lang="en-US" dirty="0">
+              <a:solidFill>
+                <a:schemeClr val="tx2"/>
+              </a:solidFill>
+            </a:endParaRPr>
+          </a:p>
+          <a:p>
+            <a:pPr>
+              <a:lnSpc>
+                <a:spcPct val="120000"/>
+              </a:lnSpc>
+              <a:spcAft>
+                <a:spcPts val="600"/>
+              </a:spcAft>
+              <a:buSzPct val="70000"/>
+            </a:pPr>
+            <a:r>
+              <a:rPr lang="en-US" dirty="0">
+                <a:solidFill>
+                  <a:schemeClr val="tx2"/>
+                </a:solidFill>
+              </a:rPr>
+              <a:t>L’ </a:t>
+            </a:r>
+            <a:r>
+              <a:rPr lang="en-US" dirty="0" err="1">
+                <a:solidFill>
+                  <a:schemeClr val="tx2"/>
+                </a:solidFill>
+              </a:rPr>
+              <a:t>obiettivo</a:t>
+            </a:r>
+            <a:r>
+              <a:rPr lang="en-US" dirty="0">
+                <a:solidFill>
+                  <a:schemeClr val="tx2"/>
+                </a:solidFill>
+              </a:rPr>
+              <a:t> era </a:t>
+            </a:r>
+            <a:r>
+              <a:rPr lang="en-US" dirty="0" err="1">
+                <a:solidFill>
+                  <a:schemeClr val="tx2"/>
+                </a:solidFill>
+              </a:rPr>
+              <a:t>quello</a:t>
+            </a:r>
+            <a:r>
+              <a:rPr lang="en-US" dirty="0">
+                <a:solidFill>
+                  <a:schemeClr val="tx2"/>
+                </a:solidFill>
+              </a:rPr>
+              <a:t> di </a:t>
+            </a:r>
+            <a:r>
+              <a:rPr lang="en-US" dirty="0" err="1">
+                <a:solidFill>
+                  <a:schemeClr val="tx2"/>
+                </a:solidFill>
+              </a:rPr>
+              <a:t>ricreare</a:t>
+            </a:r>
+            <a:r>
+              <a:rPr lang="en-US" dirty="0">
+                <a:solidFill>
+                  <a:schemeClr val="tx2"/>
+                </a:solidFill>
+              </a:rPr>
+              <a:t> il </a:t>
+            </a:r>
+            <a:r>
+              <a:rPr lang="en-US" dirty="0" err="1">
+                <a:solidFill>
+                  <a:schemeClr val="tx2"/>
+                </a:solidFill>
+              </a:rPr>
+              <a:t>gioco</a:t>
+            </a:r>
+            <a:r>
+              <a:rPr lang="en-US" dirty="0">
+                <a:solidFill>
+                  <a:schemeClr val="tx2"/>
+                </a:solidFill>
+              </a:rPr>
+              <a:t> al </a:t>
+            </a:r>
+            <a:r>
+              <a:rPr lang="en-US" dirty="0" err="1">
+                <a:solidFill>
+                  <a:schemeClr val="tx2"/>
+                </a:solidFill>
+              </a:rPr>
+              <a:t>meglio</a:t>
+            </a:r>
+            <a:r>
+              <a:rPr lang="en-US" dirty="0">
+                <a:solidFill>
+                  <a:schemeClr val="tx2"/>
+                </a:solidFill>
+              </a:rPr>
+              <a:t> </a:t>
+            </a:r>
+            <a:r>
+              <a:rPr lang="en-US" dirty="0" err="1">
+                <a:solidFill>
+                  <a:schemeClr val="tx2"/>
+                </a:solidFill>
+              </a:rPr>
+              <a:t>utilizzando</a:t>
+            </a:r>
+            <a:r>
+              <a:rPr lang="en-US" dirty="0">
+                <a:solidFill>
+                  <a:schemeClr val="tx2"/>
+                </a:solidFill>
+              </a:rPr>
+              <a:t> le </a:t>
+            </a:r>
+            <a:r>
+              <a:rPr lang="en-US" dirty="0" err="1">
+                <a:solidFill>
+                  <a:schemeClr val="tx2"/>
+                </a:solidFill>
+              </a:rPr>
+              <a:t>nostre</a:t>
+            </a:r>
+            <a:r>
+              <a:rPr lang="en-US" dirty="0">
+                <a:solidFill>
+                  <a:schemeClr val="tx2"/>
+                </a:solidFill>
+              </a:rPr>
+              <a:t> </a:t>
+            </a:r>
+            <a:r>
+              <a:rPr lang="en-US" dirty="0" err="1">
+                <a:solidFill>
+                  <a:schemeClr val="tx2"/>
+                </a:solidFill>
+              </a:rPr>
+              <a:t>conoscenze</a:t>
+            </a:r>
+            <a:r>
+              <a:rPr lang="en-US" dirty="0">
+                <a:solidFill>
+                  <a:schemeClr val="tx2"/>
+                </a:solidFill>
+              </a:rPr>
+              <a:t> e </a:t>
+            </a:r>
+            <a:r>
+              <a:rPr lang="en-US" dirty="0" err="1">
+                <a:solidFill>
+                  <a:schemeClr val="tx2"/>
+                </a:solidFill>
+              </a:rPr>
+              <a:t>imparando</a:t>
+            </a:r>
+            <a:r>
+              <a:rPr lang="en-US" dirty="0">
+                <a:solidFill>
+                  <a:schemeClr val="tx2"/>
+                </a:solidFill>
+              </a:rPr>
+              <a:t> </a:t>
+            </a:r>
+            <a:r>
+              <a:rPr lang="en-US" dirty="0" err="1">
+                <a:solidFill>
+                  <a:schemeClr val="tx2"/>
+                </a:solidFill>
+              </a:rPr>
+              <a:t>nuove</a:t>
+            </a:r>
+            <a:r>
+              <a:rPr lang="en-US" dirty="0">
+                <a:solidFill>
+                  <a:schemeClr val="tx2"/>
+                </a:solidFill>
+              </a:rPr>
+              <a:t> </a:t>
+            </a:r>
+            <a:r>
+              <a:rPr lang="en-US" dirty="0" err="1">
+                <a:solidFill>
+                  <a:schemeClr val="tx2"/>
+                </a:solidFill>
+              </a:rPr>
+              <a:t>cose</a:t>
+            </a:r>
+            <a:endParaRPr lang="en-US" dirty="0">
+              <a:solidFill>
+                <a:schemeClr val="tx2"/>
+              </a:solidFill>
+            </a:endParaRPr>
+          </a:p>
+        </p:txBody>
+      </p:sp>
+      <p:pic>
+        <p:nvPicPr>
+          <p:cNvPr id="3074" name="Picture 2" descr="Java Logo PNG vector in SVG, PDF, AI, CDR format">
+            <a:extLst>
+              <a:ext uri="{FF2B5EF4-FFF2-40B4-BE49-F238E27FC236}">
+                <a16:creationId xmlns:a16="http://schemas.microsoft.com/office/drawing/2014/main" id="{AAFF1FED-18B5-9508-B428-069FC0EED9D2}"/>
+              </a:ext>
+            </a:extLst>
+          </p:cNvPr>
+          <p:cNvPicPr>
+            <a:picLocks noChangeAspect="1" noChangeArrowheads="1"/>
+          </p:cNvPicPr>
+          <p:nvPr/>
+        </p:nvPicPr>
+        <p:blipFill rotWithShape="1">
+          <a:blip r:embed="rId2">
+            <a:extLst>
+              <a:ext uri="{28A0092B-C50C-407E-A947-70E740481C1C}">
+                <a14:useLocalDpi xmlns:a14="http://schemas.microsoft.com/office/drawing/2010/main" val="0"/>
+              </a:ext>
+            </a:extLst>
+          </a:blip>
+          <a:srcRect l="16057" r="17316" b="-1"/>
+          <a:stretch/>
+        </p:blipFill>
+        <p:spPr bwMode="auto">
+          <a:xfrm>
+            <a:off x="6096000" y="-16591"/>
+            <a:ext cx="6107073" cy="6874591"/>
+          </a:xfrm>
+          <a:prstGeom prst="rect">
+            <a:avLst/>
+          </a:prstGeom>
+          <a:noFill/>
+          <a:extLst>
+            <a:ext uri="{909E8E84-426E-40DD-AFC4-6F175D3DCCD1}">
+              <a14:hiddenFill xmlns:a14="http://schemas.microsoft.com/office/drawing/2010/main">
+                <a:solidFill>
+                  <a:srgbClr val="FFFFFF"/>
+                </a:solidFill>
+              </a14:hiddenFill>
+            </a:ext>
+          </a:extLst>
+        </p:spPr>
+      </p:pic>
     </p:spTree>
     <p:extLst>
       <p:ext uri="{BB962C8B-B14F-4D97-AF65-F5344CB8AC3E}">
-        <p14:creationId xmlns:p14="http://schemas.microsoft.com/office/powerpoint/2010/main" val="4113662077"/>
+        <p14:creationId xmlns:p14="http://schemas.microsoft.com/office/powerpoint/2010/main" val="2646533149"/>
       </p:ext>
     </p:extLst>
   </p:cSld>
@@ -4913,7 +5004,10 @@
     <p:bg>
       <p:bgPr>
         <a:solidFill>
-          <a:schemeClr val="bg2"/>
+          <a:schemeClr val="bg2">
+            <a:lumMod val="75000"/>
+            <a:lumOff val="25000"/>
+          </a:schemeClr>
         </a:solidFill>
         <a:effectLst/>
       </p:bgPr>
@@ -4932,61 +5026,9 @@
           <a:chExt cx="0" cy="0"/>
         </a:xfrm>
       </p:grpSpPr>
-      <p:cxnSp>
-        <p:nvCxnSpPr>
-          <p:cNvPr id="3079" name="Straight Connector 3078">
-            <a:extLst>
-              <a:ext uri="{FF2B5EF4-FFF2-40B4-BE49-F238E27FC236}">
-                <a16:creationId xmlns:a16="http://schemas.microsoft.com/office/drawing/2014/main" id="{EAD4CCDA-06BF-4D2A-B44F-195AEC0B5B22}"/>
-              </a:ext>
-              <a:ext uri="{C183D7F6-B498-43B3-948B-1728B52AA6E4}">
-                <adec:decorative xmlns:adec="http://schemas.microsoft.com/office/drawing/2017/decorative" val="1"/>
-              </a:ext>
-            </a:extLst>
-          </p:cNvPr>
-          <p:cNvCxnSpPr>
-            <a:cxnSpLocks noGrp="1" noRot="1" noChangeAspect="1" noMove="1" noResize="1" noEditPoints="1" noAdjustHandles="1" noChangeArrowheads="1" noChangeShapeType="1"/>
-          </p:cNvCxnSpPr>
-          <p:nvPr>
-            <p:extLst>
-              <p:ext uri="{386F3935-93C4-4BCD-93E2-E3B085C9AB24}">
-                <p16:designElem xmlns:p16="http://schemas.microsoft.com/office/powerpoint/2015/main" val="1"/>
-              </p:ext>
-            </p:extLst>
-          </p:nvPr>
-        </p:nvCxnSpPr>
-        <p:spPr>
-          <a:xfrm>
-            <a:off x="952498" y="6252722"/>
-            <a:ext cx="10325101" cy="0"/>
-          </a:xfrm>
-          <a:prstGeom prst="line">
-            <a:avLst/>
-          </a:prstGeom>
-          <a:ln w="10795">
-            <a:solidFill>
-              <a:schemeClr val="tx2"/>
-            </a:solidFill>
-          </a:ln>
-        </p:spPr>
-        <p:style>
-          <a:lnRef idx="1">
-            <a:schemeClr val="accent1"/>
-          </a:lnRef>
-          <a:fillRef idx="0">
-            <a:schemeClr val="accent1"/>
-          </a:fillRef>
-          <a:effectRef idx="0">
-            <a:schemeClr val="accent1"/>
-          </a:effectRef>
-          <a:fontRef idx="minor">
-            <a:schemeClr val="tx1"/>
-          </a:fontRef>
-        </p:style>
-      </p:cxnSp>
       <p:sp useBgFill="1">
         <p:nvSpPr>
-          <p:cNvPr id="3081" name="Rectangle 3080">
+          <p:cNvPr id="4103" name="Rectangle 4102">
             <a:extLst>
               <a:ext uri="{FF2B5EF4-FFF2-40B4-BE49-F238E27FC236}">
                 <a16:creationId xmlns:a16="http://schemas.microsoft.com/office/drawing/2014/main" id="{BF02845A-8571-40C5-9F56-8F9B3F7C4E4C}"/>
@@ -5065,78 +5107,40 @@
           <p:cNvPr id="2" name="Titolo 1">
             <a:extLst>
               <a:ext uri="{FF2B5EF4-FFF2-40B4-BE49-F238E27FC236}">
-                <a16:creationId xmlns:a16="http://schemas.microsoft.com/office/drawing/2014/main" id="{31707C28-4D0F-4531-2309-2C388516F3D0}"/>
-              </a:ext>
-            </a:extLst>
-          </p:cNvPr>
-          <p:cNvSpPr txBox="1">
-            <a:spLocks/>
-          </p:cNvSpPr>
-          <p:nvPr/>
+                <a16:creationId xmlns:a16="http://schemas.microsoft.com/office/drawing/2014/main" id="{FB5CA5BF-58B4-0E91-C189-867C7783DD5D}"/>
+              </a:ext>
+            </a:extLst>
+          </p:cNvPr>
+          <p:cNvSpPr>
+            <a:spLocks noGrp="1"/>
+          </p:cNvSpPr>
+          <p:nvPr>
+            <p:ph type="title"/>
+          </p:nvPr>
         </p:nvSpPr>
         <p:spPr>
           <a:xfrm>
             <a:off x="764593" y="895440"/>
             <a:ext cx="4569407" cy="1560083"/>
           </a:xfrm>
-          <a:prstGeom prst="rect">
-            <a:avLst/>
-          </a:prstGeom>
-        </p:spPr>
-        <p:txBody>
-          <a:bodyPr vert="horz" lIns="91440" tIns="45720" rIns="91440" bIns="45720" rtlCol="0" anchor="b">
+        </p:spPr>
+        <p:txBody>
+          <a:bodyPr>
             <a:normAutofit/>
           </a:bodyPr>
-          <a:lstStyle>
-            <a:lvl1pPr algn="l" defTabSz="914400" rtl="0" eaLnBrk="1" latinLnBrk="0" hangingPunct="1">
-              <a:lnSpc>
-                <a:spcPct val="100000"/>
-              </a:lnSpc>
-              <a:spcBef>
-                <a:spcPct val="0"/>
-              </a:spcBef>
-              <a:buNone/>
-              <a:defRPr sz="4400" kern="1200">
-                <a:solidFill>
-                  <a:schemeClr val="tx2"/>
-                </a:solidFill>
-                <a:latin typeface="+mj-lt"/>
-                <a:ea typeface="+mj-ea"/>
-                <a:cs typeface="+mj-cs"/>
-              </a:defRPr>
-            </a:lvl1pPr>
-          </a:lstStyle>
-          <a:p>
-            <a:pPr>
-              <a:spcAft>
-                <a:spcPts val="600"/>
-              </a:spcAft>
-            </a:pPr>
-            <a:r>
-              <a:rPr lang="en-US" kern="1200" dirty="0" err="1">
-                <a:solidFill>
-                  <a:schemeClr val="tx2"/>
-                </a:solidFill>
-                <a:latin typeface="+mj-lt"/>
-                <a:ea typeface="+mj-ea"/>
-                <a:cs typeface="+mj-cs"/>
-              </a:rPr>
-              <a:t>Obiettivo</a:t>
-            </a:r>
-            <a:endParaRPr lang="en-US" kern="1200" dirty="0">
-              <a:solidFill>
-                <a:schemeClr val="tx2"/>
-              </a:solidFill>
-              <a:latin typeface="+mj-lt"/>
-              <a:ea typeface="+mj-ea"/>
-              <a:cs typeface="+mj-cs"/>
-            </a:endParaRPr>
+          <a:lstStyle/>
+          <a:p>
+            <a:r>
+              <a:rPr lang="en-US" dirty="0" err="1"/>
+              <a:t>Funzionamento</a:t>
+            </a:r>
+            <a:endParaRPr lang="it-IT" dirty="0"/>
           </a:p>
         </p:txBody>
       </p:sp>
       <p:cxnSp>
         <p:nvCxnSpPr>
-          <p:cNvPr id="3083" name="Straight Connector 3082">
+          <p:cNvPr id="4105" name="Straight Connector 4104">
             <a:extLst>
               <a:ext uri="{FF2B5EF4-FFF2-40B4-BE49-F238E27FC236}">
                 <a16:creationId xmlns:a16="http://schemas.microsoft.com/office/drawing/2014/main" id="{F30BB598-81B4-41BB-BC44-CD9C29AE2EAB}"/>
@@ -5188,441 +5192,383 @@
       </p:cxnSp>
       <p:sp>
         <p:nvSpPr>
-          <p:cNvPr id="4" name="CasellaDiTesto 3">
-            <a:extLst>
-              <a:ext uri="{FF2B5EF4-FFF2-40B4-BE49-F238E27FC236}">
-                <a16:creationId xmlns:a16="http://schemas.microsoft.com/office/drawing/2014/main" id="{DAC717A3-DE2C-9CD6-12C5-45E498EBB101}"/>
-              </a:ext>
-            </a:extLst>
-          </p:cNvPr>
-          <p:cNvSpPr txBox="1"/>
-          <p:nvPr/>
+          <p:cNvPr id="3" name="Segnaposto contenuto 2">
+            <a:extLst>
+              <a:ext uri="{FF2B5EF4-FFF2-40B4-BE49-F238E27FC236}">
+                <a16:creationId xmlns:a16="http://schemas.microsoft.com/office/drawing/2014/main" id="{4BBEA77D-F589-9BD3-906C-8183B865A22C}"/>
+              </a:ext>
+            </a:extLst>
+          </p:cNvPr>
+          <p:cNvSpPr>
+            <a:spLocks noGrp="1"/>
+          </p:cNvSpPr>
+          <p:nvPr>
+            <p:ph idx="1"/>
+          </p:nvPr>
         </p:nvSpPr>
         <p:spPr>
           <a:xfrm>
             <a:off x="1570033" y="2753546"/>
             <a:ext cx="3746928" cy="3402555"/>
           </a:xfrm>
-          <a:prstGeom prst="rect">
-            <a:avLst/>
-          </a:prstGeom>
-        </p:spPr>
-        <p:txBody>
-          <a:bodyPr vert="horz" lIns="91440" tIns="45720" rIns="91440" bIns="45720" rtlCol="0" anchor="t">
+        </p:spPr>
+        <p:txBody>
+          <a:bodyPr anchor="t">
             <a:normAutofit/>
           </a:bodyPr>
           <a:lstStyle/>
           <a:p>
-            <a:pPr>
+            <a:pPr marL="0" indent="0">
               <a:lnSpc>
-                <a:spcPct val="120000"/>
+                <a:spcPct val="110000"/>
               </a:lnSpc>
-              <a:spcAft>
-                <a:spcPts val="600"/>
-              </a:spcAft>
-              <a:buSzPct val="70000"/>
+              <a:buNone/>
             </a:pPr>
             <a:r>
-              <a:rPr lang="en-US" dirty="0">
-                <a:solidFill>
-                  <a:schemeClr val="tx2"/>
-                </a:solidFill>
+              <a:rPr lang="en-US" sz="1400" dirty="0"/>
+              <a:t>Il </a:t>
+            </a:r>
+            <a:r>
+              <a:rPr lang="en-US" sz="1400" dirty="0" err="1"/>
+              <a:t>programma</a:t>
+            </a:r>
+            <a:r>
+              <a:rPr lang="en-US" sz="1400" dirty="0"/>
+              <a:t> </a:t>
+            </a:r>
+            <a:r>
+              <a:rPr lang="en-US" sz="1400" dirty="0" err="1"/>
+              <a:t>permette</a:t>
+            </a:r>
+            <a:r>
+              <a:rPr lang="en-US" sz="1400" dirty="0"/>
+              <a:t> di </a:t>
+            </a:r>
+            <a:r>
+              <a:rPr lang="en-US" sz="1400" dirty="0" err="1"/>
+              <a:t>giocare</a:t>
+            </a:r>
+            <a:r>
+              <a:rPr lang="en-US" sz="1400" dirty="0"/>
+              <a:t> ad </a:t>
+            </a:r>
+            <a:r>
+              <a:rPr lang="en-US" sz="1400" dirty="0" err="1"/>
+              <a:t>una</a:t>
+            </a:r>
+            <a:r>
+              <a:rPr lang="en-US" sz="1400" dirty="0"/>
+              <a:t> partita di Monopoly in </a:t>
+            </a:r>
+            <a:r>
+              <a:rPr lang="en-US" sz="1400" dirty="0" err="1"/>
+              <a:t>modalità</a:t>
+            </a:r>
+            <a:r>
+              <a:rPr lang="en-US" sz="1400" dirty="0"/>
+              <a:t> </a:t>
+            </a:r>
+            <a:r>
+              <a:rPr lang="en-US" sz="1400" dirty="0" err="1"/>
+              <a:t>virtuale</a:t>
+            </a:r>
+            <a:endParaRPr lang="en-US" sz="1400" dirty="0"/>
+          </a:p>
+          <a:p>
+            <a:pPr marL="0" indent="0">
+              <a:lnSpc>
+                <a:spcPct val="110000"/>
+              </a:lnSpc>
+              <a:buNone/>
+            </a:pPr>
+            <a:r>
+              <a:rPr lang="en-US" sz="1400" dirty="0" err="1"/>
+              <a:t>L’utente</a:t>
+            </a:r>
+            <a:r>
+              <a:rPr lang="en-US" sz="1400" dirty="0"/>
+              <a:t> </a:t>
+            </a:r>
+            <a:r>
+              <a:rPr lang="en-US" sz="1400" dirty="0" err="1"/>
+              <a:t>può</a:t>
+            </a:r>
+            <a:r>
+              <a:rPr lang="en-US" sz="1400" dirty="0"/>
+              <a:t> </a:t>
+            </a:r>
+            <a:r>
+              <a:rPr lang="en-US" sz="1400" dirty="0" err="1"/>
+              <a:t>eseguire</a:t>
+            </a:r>
+            <a:r>
+              <a:rPr lang="en-US" sz="1400" dirty="0"/>
+              <a:t> </a:t>
+            </a:r>
+            <a:r>
+              <a:rPr lang="en-US" sz="1400" dirty="0" err="1"/>
+              <a:t>tutte</a:t>
+            </a:r>
+            <a:r>
+              <a:rPr lang="en-US" sz="1400" dirty="0"/>
+              <a:t> le </a:t>
+            </a:r>
+            <a:r>
+              <a:rPr lang="en-US" sz="1400" dirty="0" err="1"/>
+              <a:t>azioni</a:t>
+            </a:r>
+            <a:r>
+              <a:rPr lang="en-US" sz="1400" dirty="0"/>
+              <a:t> </a:t>
+            </a:r>
+            <a:r>
+              <a:rPr lang="en-US" sz="1400" dirty="0" err="1"/>
+              <a:t>che</a:t>
+            </a:r>
+            <a:r>
+              <a:rPr lang="en-US" sz="1400" dirty="0"/>
+              <a:t> </a:t>
+            </a:r>
+            <a:r>
+              <a:rPr lang="en-US" sz="1400" dirty="0" err="1"/>
+              <a:t>si</a:t>
+            </a:r>
+            <a:r>
+              <a:rPr lang="en-US" sz="1400" dirty="0"/>
+              <a:t> </a:t>
+            </a:r>
+            <a:r>
+              <a:rPr lang="en-US" sz="1400" dirty="0" err="1"/>
+              <a:t>posso</a:t>
+            </a:r>
+            <a:r>
+              <a:rPr lang="en-US" sz="1400" dirty="0"/>
+              <a:t> </a:t>
+            </a:r>
+            <a:r>
+              <a:rPr lang="en-US" sz="1400" dirty="0" err="1"/>
+              <a:t>eseguire</a:t>
+            </a:r>
+            <a:r>
+              <a:rPr lang="en-US" sz="1400" dirty="0"/>
+              <a:t> </a:t>
+            </a:r>
+            <a:r>
+              <a:rPr lang="en-US" sz="1400" dirty="0" err="1"/>
+              <a:t>su</a:t>
+            </a:r>
+            <a:r>
+              <a:rPr lang="en-US" sz="1400" dirty="0"/>
+              <a:t> un classico Monopoly, come </a:t>
+            </a:r>
+            <a:r>
+              <a:rPr lang="en-US" sz="1400" dirty="0" err="1"/>
+              <a:t>lanciare</a:t>
+            </a:r>
+            <a:r>
+              <a:rPr lang="en-US" sz="1400" dirty="0"/>
+              <a:t> </a:t>
+            </a:r>
+            <a:r>
+              <a:rPr lang="en-US" sz="1400" dirty="0" err="1"/>
+              <a:t>i</a:t>
+            </a:r>
+            <a:r>
+              <a:rPr lang="en-US" sz="1400" dirty="0"/>
+              <a:t> </a:t>
+            </a:r>
+            <a:r>
+              <a:rPr lang="en-US" sz="1400" dirty="0" err="1"/>
+              <a:t>dadi</a:t>
+            </a:r>
+            <a:r>
+              <a:rPr lang="en-US" sz="1400" dirty="0"/>
+              <a:t>, </a:t>
+            </a:r>
+            <a:r>
+              <a:rPr lang="en-US" sz="1400" dirty="0" err="1"/>
+              <a:t>muovere</a:t>
+            </a:r>
+            <a:r>
+              <a:rPr lang="en-US" sz="1400" dirty="0"/>
+              <a:t> la </a:t>
+            </a:r>
+            <a:r>
+              <a:rPr lang="en-US" sz="1400" dirty="0" err="1"/>
+              <a:t>pedina</a:t>
+            </a:r>
+            <a:r>
+              <a:rPr lang="en-US" sz="1400" dirty="0"/>
+              <a:t>, </a:t>
+            </a:r>
+            <a:r>
+              <a:rPr lang="en-US" sz="1400" dirty="0" err="1"/>
+              <a:t>comprare</a:t>
+            </a:r>
+            <a:r>
+              <a:rPr lang="en-US" sz="1400" dirty="0"/>
+              <a:t> </a:t>
+            </a:r>
+            <a:r>
+              <a:rPr lang="en-US" sz="1400" dirty="0" err="1"/>
+              <a:t>una</a:t>
+            </a:r>
+            <a:r>
+              <a:rPr lang="en-US" sz="1400" dirty="0"/>
+              <a:t> </a:t>
+            </a:r>
+            <a:r>
+              <a:rPr lang="en-US" sz="1400" dirty="0" err="1"/>
+              <a:t>proprietà</a:t>
+            </a:r>
+            <a:r>
+              <a:rPr lang="en-US" sz="1400" dirty="0"/>
+              <a:t>, </a:t>
+            </a:r>
+            <a:r>
+              <a:rPr lang="en-US" sz="1400" dirty="0" err="1"/>
+              <a:t>ipotecare</a:t>
+            </a:r>
+            <a:r>
+              <a:rPr lang="en-US" sz="1400" dirty="0"/>
+              <a:t> </a:t>
+            </a:r>
+            <a:r>
+              <a:rPr lang="en-US" sz="1400" dirty="0" err="1"/>
+              <a:t>una</a:t>
+            </a:r>
+            <a:r>
+              <a:rPr lang="en-US" sz="1400" dirty="0"/>
+              <a:t> </a:t>
+            </a:r>
+            <a:r>
+              <a:rPr lang="en-US" sz="1400" dirty="0" err="1"/>
+              <a:t>proprietà</a:t>
+            </a:r>
+            <a:r>
+              <a:rPr lang="en-US" sz="1400" dirty="0"/>
+              <a:t>, </a:t>
+            </a:r>
+            <a:r>
+              <a:rPr lang="en-US" sz="1400" dirty="0" err="1"/>
+              <a:t>pagare</a:t>
+            </a:r>
+            <a:r>
+              <a:rPr lang="en-US" sz="1400" dirty="0"/>
+              <a:t> le tasse </a:t>
+            </a:r>
+            <a:r>
+              <a:rPr lang="en-US" sz="1400" dirty="0" err="1"/>
+              <a:t>agli</a:t>
+            </a:r>
+            <a:r>
+              <a:rPr lang="en-US" sz="1400" dirty="0"/>
+              <a:t> </a:t>
+            </a:r>
+            <a:r>
+              <a:rPr lang="en-US" sz="1400" dirty="0" err="1"/>
+              <a:t>altri</a:t>
+            </a:r>
+            <a:r>
+              <a:rPr lang="en-US" sz="1400" dirty="0"/>
+              <a:t> </a:t>
+            </a:r>
+            <a:r>
+              <a:rPr lang="en-US" sz="1400" dirty="0" err="1"/>
+              <a:t>giocatori</a:t>
+            </a:r>
+            <a:r>
+              <a:rPr lang="en-US" sz="1400" dirty="0"/>
+              <a:t>…</a:t>
+            </a:r>
+          </a:p>
+          <a:p>
+            <a:pPr marL="0" indent="0">
+              <a:lnSpc>
+                <a:spcPct val="110000"/>
+              </a:lnSpc>
+              <a:buNone/>
+            </a:pPr>
+            <a:r>
+              <a:rPr lang="en-US" sz="1400" dirty="0" err="1"/>
+              <a:t>Tutto</a:t>
+            </a:r>
+            <a:r>
+              <a:rPr lang="en-US" sz="1400" dirty="0"/>
+              <a:t> il </a:t>
+            </a:r>
+            <a:r>
+              <a:rPr lang="en-US" sz="1400" dirty="0" err="1"/>
+              <a:t>codice</a:t>
+            </a:r>
+            <a:r>
+              <a:rPr lang="en-US" sz="1400" dirty="0"/>
+              <a:t> e la </a:t>
+            </a:r>
+            <a:r>
+              <a:rPr lang="en-US" sz="1400" dirty="0" err="1"/>
+              <a:t>spiegazione</a:t>
+            </a:r>
+            <a:r>
+              <a:rPr lang="en-US" sz="1400" dirty="0"/>
+              <a:t> </a:t>
+            </a:r>
+            <a:r>
+              <a:rPr lang="en-US" sz="1400" dirty="0" err="1"/>
+              <a:t>su</a:t>
+            </a:r>
+            <a:r>
+              <a:rPr lang="en-US" sz="1400" dirty="0"/>
+              <a:t> come </a:t>
+            </a:r>
+            <a:r>
+              <a:rPr lang="en-US" sz="1400" dirty="0" err="1"/>
+              <a:t>avviarlo</a:t>
+            </a:r>
+            <a:r>
+              <a:rPr lang="en-US" sz="1400" dirty="0"/>
+              <a:t> è possible </a:t>
+            </a:r>
+            <a:r>
+              <a:rPr lang="en-US" sz="1400" dirty="0" err="1"/>
+              <a:t>trovarlo</a:t>
+            </a:r>
+            <a:r>
+              <a:rPr lang="en-US" sz="1400" dirty="0"/>
+              <a:t> in </a:t>
+            </a:r>
+            <a:r>
+              <a:rPr lang="en-US" sz="1400" dirty="0" err="1"/>
+              <a:t>questa</a:t>
+            </a:r>
+            <a:r>
+              <a:rPr lang="en-US" sz="1400" dirty="0"/>
+              <a:t> </a:t>
+            </a:r>
+            <a:r>
+              <a:rPr lang="en-US" sz="1400" dirty="0" err="1"/>
+              <a:t>pagina</a:t>
+            </a:r>
+            <a:r>
+              <a:rPr lang="en-US" sz="1400" dirty="0"/>
+              <a:t>:  </a:t>
+            </a:r>
+            <a:r>
+              <a:rPr lang="en-US" sz="1400" dirty="0">
+                <a:hlinkClick r:id="rId2"/>
               </a:rPr>
-              <a:t>In </a:t>
-            </a:r>
-            <a:r>
-              <a:rPr lang="en-US" dirty="0" err="1">
-                <a:solidFill>
-                  <a:schemeClr val="tx2"/>
-                </a:solidFill>
-              </a:rPr>
-              <a:t>questo</a:t>
-            </a:r>
-            <a:r>
-              <a:rPr lang="en-US" dirty="0">
-                <a:solidFill>
-                  <a:schemeClr val="tx2"/>
-                </a:solidFill>
-              </a:rPr>
-              <a:t> </a:t>
-            </a:r>
-            <a:r>
-              <a:rPr lang="en-US" dirty="0" err="1">
-                <a:solidFill>
-                  <a:schemeClr val="tx2"/>
-                </a:solidFill>
-              </a:rPr>
-              <a:t>si</a:t>
-            </a:r>
-            <a:r>
-              <a:rPr lang="en-US" dirty="0">
-                <a:solidFill>
-                  <a:schemeClr val="tx2"/>
-                </a:solidFill>
-              </a:rPr>
-              <a:t> è </a:t>
-            </a:r>
-            <a:r>
-              <a:rPr lang="en-US" dirty="0" err="1">
-                <a:solidFill>
-                  <a:schemeClr val="tx2"/>
-                </a:solidFill>
-              </a:rPr>
-              <a:t>cercato</a:t>
-            </a:r>
-            <a:r>
-              <a:rPr lang="en-US" dirty="0">
-                <a:solidFill>
-                  <a:schemeClr val="tx2"/>
-                </a:solidFill>
-              </a:rPr>
-              <a:t> di </a:t>
-            </a:r>
-            <a:r>
-              <a:rPr lang="en-US" dirty="0" err="1">
-                <a:solidFill>
-                  <a:schemeClr val="tx2"/>
-                </a:solidFill>
-              </a:rPr>
-              <a:t>realizzare</a:t>
-            </a:r>
-            <a:r>
-              <a:rPr lang="en-US" dirty="0">
-                <a:solidFill>
-                  <a:schemeClr val="tx2"/>
-                </a:solidFill>
-              </a:rPr>
-              <a:t> </a:t>
-            </a:r>
-            <a:r>
-              <a:rPr lang="en-US" dirty="0" err="1">
-                <a:solidFill>
-                  <a:schemeClr val="tx2"/>
-                </a:solidFill>
-              </a:rPr>
-              <a:t>una</a:t>
-            </a:r>
-            <a:r>
-              <a:rPr lang="en-US" dirty="0">
-                <a:solidFill>
-                  <a:schemeClr val="tx2"/>
-                </a:solidFill>
-              </a:rPr>
-              <a:t> </a:t>
-            </a:r>
-            <a:r>
-              <a:rPr lang="en-US" dirty="0" err="1">
-                <a:solidFill>
-                  <a:schemeClr val="tx2"/>
-                </a:solidFill>
-              </a:rPr>
-              <a:t>copia</a:t>
-            </a:r>
-            <a:r>
-              <a:rPr lang="en-US" dirty="0">
-                <a:solidFill>
-                  <a:schemeClr val="tx2"/>
-                </a:solidFill>
-              </a:rPr>
-              <a:t> del </a:t>
-            </a:r>
-            <a:r>
-              <a:rPr lang="en-US" dirty="0" err="1">
-                <a:solidFill>
-                  <a:schemeClr val="tx2"/>
-                </a:solidFill>
-              </a:rPr>
-              <a:t>gioco</a:t>
-            </a:r>
-            <a:r>
-              <a:rPr lang="en-US" dirty="0">
-                <a:solidFill>
-                  <a:schemeClr val="tx2"/>
-                </a:solidFill>
-              </a:rPr>
-              <a:t> da </a:t>
-            </a:r>
-            <a:r>
-              <a:rPr lang="en-US" dirty="0" err="1">
-                <a:solidFill>
-                  <a:schemeClr val="tx2"/>
-                </a:solidFill>
-              </a:rPr>
-              <a:t>tavolo</a:t>
-            </a:r>
-            <a:r>
-              <a:rPr lang="en-US" dirty="0">
-                <a:solidFill>
-                  <a:schemeClr val="tx2"/>
-                </a:solidFill>
-              </a:rPr>
-              <a:t> «Monopoly» </a:t>
-            </a:r>
-            <a:r>
-              <a:rPr lang="en-US" dirty="0" err="1">
-                <a:solidFill>
-                  <a:schemeClr val="tx2"/>
-                </a:solidFill>
-              </a:rPr>
-              <a:t>utilizzando</a:t>
-            </a:r>
-            <a:r>
-              <a:rPr lang="en-US" dirty="0">
-                <a:solidFill>
-                  <a:schemeClr val="tx2"/>
-                </a:solidFill>
-              </a:rPr>
-              <a:t> il </a:t>
-            </a:r>
-            <a:r>
-              <a:rPr lang="en-US" dirty="0" err="1">
-                <a:solidFill>
-                  <a:schemeClr val="tx2"/>
-                </a:solidFill>
-              </a:rPr>
-              <a:t>linguaggio</a:t>
-            </a:r>
-            <a:r>
-              <a:rPr lang="en-US" dirty="0">
-                <a:solidFill>
-                  <a:schemeClr val="tx2"/>
-                </a:solidFill>
-              </a:rPr>
-              <a:t> di </a:t>
-            </a:r>
-            <a:r>
-              <a:rPr lang="en-US" dirty="0" err="1">
-                <a:solidFill>
-                  <a:schemeClr val="tx2"/>
-                </a:solidFill>
-              </a:rPr>
-              <a:t>programmazione</a:t>
-            </a:r>
-            <a:r>
-              <a:rPr lang="en-US" dirty="0">
-                <a:solidFill>
-                  <a:schemeClr val="tx2"/>
-                </a:solidFill>
-              </a:rPr>
-              <a:t> Java</a:t>
-            </a:r>
-          </a:p>
-          <a:p>
-            <a:pPr>
-              <a:lnSpc>
-                <a:spcPct val="120000"/>
-              </a:lnSpc>
-              <a:spcAft>
-                <a:spcPts val="600"/>
-              </a:spcAft>
-              <a:buSzPct val="70000"/>
-            </a:pPr>
-            <a:endParaRPr lang="en-US" dirty="0">
-              <a:solidFill>
-                <a:schemeClr val="tx2"/>
-              </a:solidFill>
-            </a:endParaRPr>
-          </a:p>
-          <a:p>
-            <a:pPr>
-              <a:lnSpc>
-                <a:spcPct val="120000"/>
-              </a:lnSpc>
-              <a:spcAft>
-                <a:spcPts val="600"/>
-              </a:spcAft>
-              <a:buSzPct val="70000"/>
-            </a:pPr>
-            <a:r>
-              <a:rPr lang="en-US" dirty="0">
-                <a:solidFill>
-                  <a:schemeClr val="tx2"/>
-                </a:solidFill>
-              </a:rPr>
-              <a:t>L’ </a:t>
-            </a:r>
-            <a:r>
-              <a:rPr lang="en-US" dirty="0" err="1">
-                <a:solidFill>
-                  <a:schemeClr val="tx2"/>
-                </a:solidFill>
-              </a:rPr>
-              <a:t>obiettivo</a:t>
-            </a:r>
-            <a:r>
-              <a:rPr lang="en-US" dirty="0">
-                <a:solidFill>
-                  <a:schemeClr val="tx2"/>
-                </a:solidFill>
-              </a:rPr>
-              <a:t> era </a:t>
-            </a:r>
-            <a:r>
-              <a:rPr lang="en-US" dirty="0" err="1">
-                <a:solidFill>
-                  <a:schemeClr val="tx2"/>
-                </a:solidFill>
-              </a:rPr>
-              <a:t>quello</a:t>
-            </a:r>
-            <a:r>
-              <a:rPr lang="en-US" dirty="0">
-                <a:solidFill>
-                  <a:schemeClr val="tx2"/>
-                </a:solidFill>
-              </a:rPr>
-              <a:t> di </a:t>
-            </a:r>
-            <a:r>
-              <a:rPr lang="en-US" dirty="0" err="1">
-                <a:solidFill>
-                  <a:schemeClr val="tx2"/>
-                </a:solidFill>
-              </a:rPr>
-              <a:t>ricreare</a:t>
-            </a:r>
-            <a:r>
-              <a:rPr lang="en-US" dirty="0">
-                <a:solidFill>
-                  <a:schemeClr val="tx2"/>
-                </a:solidFill>
-              </a:rPr>
-              <a:t> il </a:t>
-            </a:r>
-            <a:r>
-              <a:rPr lang="en-US" dirty="0" err="1">
-                <a:solidFill>
-                  <a:schemeClr val="tx2"/>
-                </a:solidFill>
-              </a:rPr>
-              <a:t>gioco</a:t>
-            </a:r>
-            <a:r>
-              <a:rPr lang="en-US" dirty="0">
-                <a:solidFill>
-                  <a:schemeClr val="tx2"/>
-                </a:solidFill>
-              </a:rPr>
-              <a:t> al </a:t>
-            </a:r>
-            <a:r>
-              <a:rPr lang="en-US" dirty="0" err="1">
-                <a:solidFill>
-                  <a:schemeClr val="tx2"/>
-                </a:solidFill>
-              </a:rPr>
-              <a:t>meglio</a:t>
-            </a:r>
-            <a:r>
-              <a:rPr lang="en-US" dirty="0">
-                <a:solidFill>
-                  <a:schemeClr val="tx2"/>
-                </a:solidFill>
-              </a:rPr>
-              <a:t> </a:t>
-            </a:r>
-            <a:r>
-              <a:rPr lang="en-US" dirty="0" err="1">
-                <a:solidFill>
-                  <a:schemeClr val="tx2"/>
-                </a:solidFill>
-              </a:rPr>
-              <a:t>utilizzando</a:t>
-            </a:r>
-            <a:r>
-              <a:rPr lang="en-US" dirty="0">
-                <a:solidFill>
-                  <a:schemeClr val="tx2"/>
-                </a:solidFill>
-              </a:rPr>
-              <a:t> le </a:t>
-            </a:r>
-            <a:r>
-              <a:rPr lang="en-US" dirty="0" err="1">
-                <a:solidFill>
-                  <a:schemeClr val="tx2"/>
-                </a:solidFill>
-              </a:rPr>
-              <a:t>nostre</a:t>
-            </a:r>
-            <a:r>
-              <a:rPr lang="en-US" dirty="0">
-                <a:solidFill>
-                  <a:schemeClr val="tx2"/>
-                </a:solidFill>
-              </a:rPr>
-              <a:t> </a:t>
-            </a:r>
-            <a:r>
-              <a:rPr lang="en-US" dirty="0" err="1">
-                <a:solidFill>
-                  <a:schemeClr val="tx2"/>
-                </a:solidFill>
-              </a:rPr>
-              <a:t>conoscenze</a:t>
-            </a:r>
-            <a:r>
-              <a:rPr lang="en-US" dirty="0">
-                <a:solidFill>
-                  <a:schemeClr val="tx2"/>
-                </a:solidFill>
-              </a:rPr>
-              <a:t> e </a:t>
-            </a:r>
-            <a:r>
-              <a:rPr lang="en-US" dirty="0" err="1">
-                <a:solidFill>
-                  <a:schemeClr val="tx2"/>
-                </a:solidFill>
-              </a:rPr>
-              <a:t>imparando</a:t>
-            </a:r>
-            <a:r>
-              <a:rPr lang="en-US" dirty="0">
-                <a:solidFill>
-                  <a:schemeClr val="tx2"/>
-                </a:solidFill>
-              </a:rPr>
-              <a:t> </a:t>
-            </a:r>
-            <a:r>
-              <a:rPr lang="en-US" dirty="0" err="1">
-                <a:solidFill>
-                  <a:schemeClr val="tx2"/>
-                </a:solidFill>
-              </a:rPr>
-              <a:t>nuove</a:t>
-            </a:r>
-            <a:r>
-              <a:rPr lang="en-US" dirty="0">
-                <a:solidFill>
-                  <a:schemeClr val="tx2"/>
-                </a:solidFill>
-              </a:rPr>
-              <a:t> </a:t>
-            </a:r>
-            <a:r>
-              <a:rPr lang="en-US" dirty="0" err="1">
-                <a:solidFill>
-                  <a:schemeClr val="tx2"/>
-                </a:solidFill>
-              </a:rPr>
-              <a:t>cose</a:t>
-            </a:r>
-            <a:endParaRPr lang="en-US" dirty="0">
-              <a:solidFill>
-                <a:schemeClr val="tx2"/>
-              </a:solidFill>
-            </a:endParaRPr>
+              <a:t>https://github.com/MirkoMolteni/MonopolyJava</a:t>
+            </a:r>
+            <a:endParaRPr lang="it-IT" sz="1400" dirty="0"/>
           </a:p>
         </p:txBody>
       </p:sp>
       <p:pic>
         <p:nvPicPr>
-          <p:cNvPr id="3074" name="Picture 2" descr="Java Logo PNG vector in SVG, PDF, AI, CDR format">
-            <a:extLst>
-              <a:ext uri="{FF2B5EF4-FFF2-40B4-BE49-F238E27FC236}">
-                <a16:creationId xmlns:a16="http://schemas.microsoft.com/office/drawing/2014/main" id="{AAFF1FED-18B5-9508-B428-069FC0EED9D2}"/>
+          <p:cNvPr id="4098" name="Picture 2" descr="Logo Di Vettore Dell'estratto Del Segno Di Spunta Dell'ingranaggio  Illustrazione Vettoriale - Illustrazione di ingegneria, certificato:  89817893">
+            <a:extLst>
+              <a:ext uri="{FF2B5EF4-FFF2-40B4-BE49-F238E27FC236}">
+                <a16:creationId xmlns:a16="http://schemas.microsoft.com/office/drawing/2014/main" id="{D020D30A-4CC9-D0BB-012A-83C7D4CDCA8E}"/>
               </a:ext>
             </a:extLst>
           </p:cNvPr>
@@ -5632,14 +5578,14 @@
           <p:nvPr/>
         </p:nvPicPr>
         <p:blipFill rotWithShape="1">
-          <a:blip r:embed="rId2">
+          <a:blip r:embed="rId3">
             <a:extLst>
               <a:ext uri="{28A0092B-C50C-407E-A947-70E740481C1C}">
                 <a14:useLocalDpi xmlns:a14="http://schemas.microsoft.com/office/drawing/2010/main" val="0"/>
               </a:ext>
             </a:extLst>
           </a:blip>
-          <a:srcRect l="16057" r="17316" b="-1"/>
+          <a:srcRect l="5659" r="5504" b="-3"/>
           <a:stretch/>
         </p:blipFill>
         <p:spPr bwMode="auto">
@@ -5665,7 +5611,7 @@
     </p:spTree>
     <p:extLst>
       <p:ext uri="{BB962C8B-B14F-4D97-AF65-F5344CB8AC3E}">
-        <p14:creationId xmlns:p14="http://schemas.microsoft.com/office/powerpoint/2010/main" val="2646533149"/>
+        <p14:creationId xmlns:p14="http://schemas.microsoft.com/office/powerpoint/2010/main" val="1772000084"/>
       </p:ext>
     </p:extLst>
   </p:cSld>
@@ -5681,7 +5627,10 @@
     <p:bg>
       <p:bgPr>
         <a:solidFill>
-          <a:schemeClr val="bg2"/>
+          <a:schemeClr val="bg2">
+            <a:lumMod val="75000"/>
+            <a:lumOff val="25000"/>
+          </a:schemeClr>
         </a:solidFill>
         <a:effectLst/>
       </p:bgPr>
@@ -5702,7 +5651,7 @@
       </p:grpSpPr>
       <p:sp useBgFill="1">
         <p:nvSpPr>
-          <p:cNvPr id="4103" name="Rectangle 4102">
+          <p:cNvPr id="32" name="Rectangle 27">
             <a:extLst>
               <a:ext uri="{FF2B5EF4-FFF2-40B4-BE49-F238E27FC236}">
                 <a16:creationId xmlns:a16="http://schemas.microsoft.com/office/drawing/2014/main" id="{BF02845A-8571-40C5-9F56-8F9B3F7C4E4C}"/>
@@ -5781,7 +5730,7 @@
           <p:cNvPr id="2" name="Titolo 1">
             <a:extLst>
               <a:ext uri="{FF2B5EF4-FFF2-40B4-BE49-F238E27FC236}">
-                <a16:creationId xmlns:a16="http://schemas.microsoft.com/office/drawing/2014/main" id="{FB5CA5BF-58B4-0E91-C189-867C7783DD5D}"/>
+                <a16:creationId xmlns:a16="http://schemas.microsoft.com/office/drawing/2014/main" id="{E1E8E791-D125-68A5-62B9-4D794991B797}"/>
               </a:ext>
             </a:extLst>
           </p:cNvPr>
@@ -5794,8 +5743,8 @@
         </p:nvSpPr>
         <p:spPr>
           <a:xfrm>
-            <a:off x="764593" y="895440"/>
-            <a:ext cx="4569407" cy="1560083"/>
+            <a:off x="784915" y="895441"/>
+            <a:ext cx="6796985" cy="1553846"/>
           </a:xfrm>
         </p:spPr>
         <p:txBody>
@@ -5805,8 +5754,16 @@
           <a:lstStyle/>
           <a:p>
             <a:r>
-              <a:rPr lang="en-US" dirty="0" err="1"/>
-              <a:t>Funzionamento</a:t>
+              <a:rPr lang="en-US"/>
+              <a:t>Tecniche</a:t>
+            </a:r>
+            <a:r>
+              <a:rPr lang="en-US" dirty="0"/>
+              <a:t> </a:t>
+            </a:r>
+            <a:r>
+              <a:rPr lang="en-US"/>
+              <a:t>utilizzate</a:t>
             </a:r>
             <a:endParaRPr lang="it-IT" dirty="0"/>
           </a:p>
@@ -5814,7 +5771,7 @@
       </p:sp>
       <p:cxnSp>
         <p:nvCxnSpPr>
-          <p:cNvPr id="4105" name="Straight Connector 4104">
+          <p:cNvPr id="33" name="Straight Connector 29">
             <a:extLst>
               <a:ext uri="{FF2B5EF4-FFF2-40B4-BE49-F238E27FC236}">
                 <a16:creationId xmlns:a16="http://schemas.microsoft.com/office/drawing/2014/main" id="{F30BB598-81B4-41BB-BC44-CD9C29AE2EAB}"/>
@@ -5837,8 +5794,8 @@
         </p:nvCxnSpPr>
         <p:spPr>
           <a:xfrm>
-            <a:off x="952500" y="2871627"/>
-            <a:ext cx="0" cy="3186701"/>
+            <a:off x="952500" y="2762794"/>
+            <a:ext cx="0" cy="3292672"/>
           </a:xfrm>
           <a:prstGeom prst="line">
             <a:avLst/>
@@ -5869,7 +5826,7 @@
           <p:cNvPr id="3" name="Segnaposto contenuto 2">
             <a:extLst>
               <a:ext uri="{FF2B5EF4-FFF2-40B4-BE49-F238E27FC236}">
-                <a16:creationId xmlns:a16="http://schemas.microsoft.com/office/drawing/2014/main" id="{4BBEA77D-F589-9BD3-906C-8183B865A22C}"/>
+                <a16:creationId xmlns:a16="http://schemas.microsoft.com/office/drawing/2014/main" id="{65838E50-B752-B3CC-062F-F0D9607079D5}"/>
               </a:ext>
             </a:extLst>
           </p:cNvPr>
@@ -5882,12 +5839,12 @@
         </p:nvSpPr>
         <p:spPr>
           <a:xfrm>
-            <a:off x="1570033" y="2753546"/>
-            <a:ext cx="3746928" cy="3402555"/>
-          </a:xfrm>
-        </p:spPr>
-        <p:txBody>
-          <a:bodyPr anchor="t">
+            <a:off x="1572638" y="2750172"/>
+            <a:ext cx="6009262" cy="3388968"/>
+          </a:xfrm>
+        </p:spPr>
+        <p:txBody>
+          <a:bodyPr anchor="b">
             <a:normAutofit/>
           </a:bodyPr>
           <a:lstStyle/>
@@ -5899,54 +5856,54 @@
               <a:buNone/>
             </a:pPr>
             <a:r>
-              <a:rPr lang="en-US" sz="1400" dirty="0"/>
+              <a:rPr lang="en-US" dirty="0"/>
               <a:t>Il </a:t>
             </a:r>
             <a:r>
-              <a:rPr lang="en-US" sz="1400" dirty="0" err="1"/>
+              <a:rPr lang="en-US" dirty="0" err="1"/>
               <a:t>programma</a:t>
             </a:r>
             <a:r>
-              <a:rPr lang="en-US" sz="1400" dirty="0"/>
+              <a:rPr lang="en-US" dirty="0"/>
+              <a:t> è </a:t>
+            </a:r>
+            <a:r>
+              <a:rPr lang="en-US" dirty="0" err="1"/>
+              <a:t>costituito</a:t>
+            </a:r>
+            <a:r>
+              <a:rPr lang="en-US" dirty="0"/>
+              <a:t> da </a:t>
+            </a:r>
+            <a:r>
+              <a:rPr lang="en-US" dirty="0" err="1"/>
+              <a:t>dei</a:t>
+            </a:r>
+            <a:r>
+              <a:rPr lang="en-US" dirty="0"/>
+              <a:t> Client </a:t>
+            </a:r>
+            <a:r>
+              <a:rPr lang="en-US" dirty="0" err="1"/>
+              <a:t>che</a:t>
+            </a:r>
+            <a:r>
+              <a:rPr lang="en-US" dirty="0"/>
               <a:t> </a:t>
             </a:r>
             <a:r>
-              <a:rPr lang="en-US" sz="1400" dirty="0" err="1"/>
-              <a:t>permette</a:t>
-            </a:r>
-            <a:r>
-              <a:rPr lang="en-US" sz="1400" dirty="0"/>
-              <a:t> di </a:t>
-            </a:r>
-            <a:r>
-              <a:rPr lang="en-US" sz="1400" dirty="0" err="1"/>
+              <a:rPr lang="en-US" dirty="0" err="1"/>
+              <a:t>comunicano</a:t>
+            </a:r>
+            <a:r>
+              <a:rPr lang="en-US" dirty="0"/>
+              <a:t> con il Server per </a:t>
+            </a:r>
+            <a:r>
+              <a:rPr lang="en-US" dirty="0" err="1"/>
               <a:t>giocare</a:t>
             </a:r>
-            <a:r>
-              <a:rPr lang="en-US" sz="1400" dirty="0"/>
-              <a:t> ad </a:t>
-            </a:r>
-            <a:r>
-              <a:rPr lang="en-US" sz="1400" dirty="0" err="1"/>
-              <a:t>una</a:t>
-            </a:r>
-            <a:r>
-              <a:rPr lang="en-US" sz="1400" dirty="0"/>
-              <a:t> partita di Monopoly in </a:t>
-            </a:r>
-            <a:r>
-              <a:rPr lang="en-US" sz="1400" dirty="0" err="1"/>
-              <a:t>modalità</a:t>
-            </a:r>
-            <a:r>
-              <a:rPr lang="en-US" sz="1400" dirty="0"/>
-              <a:t> </a:t>
-            </a:r>
-            <a:r>
-              <a:rPr lang="en-US" sz="1400" dirty="0" err="1"/>
-              <a:t>virtuale</a:t>
-            </a:r>
-            <a:endParaRPr lang="en-US" sz="1400" dirty="0"/>
+            <a:endParaRPr lang="en-US" dirty="0"/>
           </a:p>
           <a:p>
             <a:pPr marL="0" indent="0">
@@ -5956,204 +5913,96 @@
               <a:buNone/>
             </a:pPr>
             <a:r>
-              <a:rPr lang="en-US" sz="1400" dirty="0" err="1"/>
-              <a:t>L’utente</a:t>
-            </a:r>
-            <a:r>
-              <a:rPr lang="en-US" sz="1400" dirty="0"/>
+              <a:rPr lang="en-US" dirty="0"/>
+              <a:t>Questa </a:t>
+            </a:r>
+            <a:r>
+              <a:rPr lang="en-US" dirty="0" err="1"/>
+              <a:t>comunicazione</a:t>
+            </a:r>
+            <a:r>
+              <a:rPr lang="en-US" dirty="0"/>
+              <a:t> è </a:t>
+            </a:r>
+            <a:r>
+              <a:rPr lang="en-US" dirty="0" err="1"/>
+              <a:t>basata</a:t>
+            </a:r>
+            <a:r>
+              <a:rPr lang="en-US" dirty="0"/>
               <a:t> </a:t>
             </a:r>
             <a:r>
-              <a:rPr lang="en-US" sz="1400" dirty="0" err="1"/>
-              <a:t>può</a:t>
-            </a:r>
-            <a:r>
-              <a:rPr lang="en-US" sz="1400" dirty="0"/>
+              <a:rPr lang="en-US" dirty="0" err="1"/>
+              <a:t>su</a:t>
+            </a:r>
+            <a:r>
+              <a:rPr lang="en-US" dirty="0"/>
+              <a:t> TCP, e </a:t>
+            </a:r>
+            <a:r>
+              <a:rPr lang="en-US" dirty="0" err="1"/>
+              <a:t>i</a:t>
+            </a:r>
+            <a:r>
+              <a:rPr lang="en-US" dirty="0"/>
               <a:t> </a:t>
             </a:r>
             <a:r>
-              <a:rPr lang="en-US" sz="1400" dirty="0" err="1"/>
-              <a:t>eseguire</a:t>
-            </a:r>
-            <a:r>
-              <a:rPr lang="en-US" sz="1400" dirty="0"/>
+              <a:rPr lang="en-US" dirty="0" err="1"/>
+              <a:t>messaggi</a:t>
+            </a:r>
+            <a:r>
+              <a:rPr lang="en-US" dirty="0"/>
               <a:t> </a:t>
             </a:r>
             <a:r>
-              <a:rPr lang="en-US" sz="1400" dirty="0" err="1"/>
-              <a:t>tutte</a:t>
-            </a:r>
-            <a:r>
-              <a:rPr lang="en-US" sz="1400" dirty="0"/>
-              <a:t> le </a:t>
-            </a:r>
-            <a:r>
-              <a:rPr lang="en-US" sz="1400" dirty="0" err="1"/>
-              <a:t>azioni</a:t>
-            </a:r>
-            <a:r>
-              <a:rPr lang="en-US" sz="1400" dirty="0"/>
+              <a:rPr lang="en-US" dirty="0" err="1"/>
+              <a:t>che</a:t>
+            </a:r>
+            <a:r>
+              <a:rPr lang="en-US" dirty="0"/>
               <a:t> </a:t>
             </a:r>
             <a:r>
-              <a:rPr lang="en-US" sz="1400" dirty="0" err="1"/>
-              <a:t>che</a:t>
-            </a:r>
-            <a:r>
-              <a:rPr lang="en-US" sz="1400" dirty="0"/>
+              <a:rPr lang="en-US" dirty="0" err="1"/>
+              <a:t>vengono</a:t>
+            </a:r>
+            <a:r>
+              <a:rPr lang="en-US" dirty="0"/>
               <a:t> </a:t>
             </a:r>
             <a:r>
-              <a:rPr lang="en-US" sz="1400" dirty="0" err="1"/>
-              <a:t>si</a:t>
-            </a:r>
-            <a:r>
-              <a:rPr lang="en-US" sz="1400" dirty="0"/>
+              <a:rPr lang="en-US" dirty="0" err="1"/>
+              <a:t>inviati</a:t>
+            </a:r>
+            <a:r>
+              <a:rPr lang="en-US" dirty="0"/>
               <a:t> </a:t>
             </a:r>
             <a:r>
-              <a:rPr lang="en-US" sz="1400" dirty="0" err="1"/>
-              <a:t>posso</a:t>
-            </a:r>
-            <a:r>
-              <a:rPr lang="en-US" sz="1400" dirty="0"/>
-              <a:t> </a:t>
-            </a:r>
-            <a:r>
-              <a:rPr lang="en-US" sz="1400" dirty="0" err="1"/>
-              <a:t>eseguire</a:t>
-            </a:r>
-            <a:r>
-              <a:rPr lang="en-US" sz="1400" dirty="0"/>
-              <a:t> </a:t>
-            </a:r>
-            <a:r>
-              <a:rPr lang="en-US" sz="1400" dirty="0" err="1"/>
-              <a:t>su</a:t>
-            </a:r>
-            <a:r>
-              <a:rPr lang="en-US" sz="1400" dirty="0"/>
-              <a:t> un classico Monopoly, come </a:t>
-            </a:r>
-            <a:r>
-              <a:rPr lang="en-US" sz="1400" dirty="0" err="1"/>
-              <a:t>lanciare</a:t>
-            </a:r>
-            <a:r>
-              <a:rPr lang="en-US" sz="1400" dirty="0"/>
-              <a:t> </a:t>
-            </a:r>
-            <a:r>
-              <a:rPr lang="en-US" sz="1400" dirty="0" err="1"/>
-              <a:t>i</a:t>
-            </a:r>
-            <a:r>
-              <a:rPr lang="en-US" sz="1400" dirty="0"/>
-              <a:t> </a:t>
-            </a:r>
-            <a:r>
-              <a:rPr lang="en-US" sz="1400" dirty="0" err="1"/>
-              <a:t>dadi</a:t>
-            </a:r>
-            <a:r>
-              <a:rPr lang="en-US" sz="1400" dirty="0"/>
-              <a:t>, </a:t>
-            </a:r>
-            <a:r>
-              <a:rPr lang="en-US" sz="1400" dirty="0" err="1"/>
-              <a:t>muovere</a:t>
-            </a:r>
-            <a:r>
-              <a:rPr lang="en-US" sz="1400" dirty="0"/>
-              <a:t> la </a:t>
-            </a:r>
-            <a:r>
-              <a:rPr lang="en-US" sz="1400" dirty="0" err="1"/>
-              <a:t>pedina</a:t>
-            </a:r>
-            <a:r>
-              <a:rPr lang="en-US" sz="1400" dirty="0"/>
-              <a:t>, </a:t>
-            </a:r>
-            <a:r>
-              <a:rPr lang="en-US" sz="1400" dirty="0" err="1"/>
-              <a:t>comprare</a:t>
-            </a:r>
-            <a:r>
-              <a:rPr lang="en-US" sz="1400" dirty="0"/>
-              <a:t> </a:t>
-            </a:r>
-            <a:r>
-              <a:rPr lang="en-US" sz="1400" dirty="0" err="1"/>
-              <a:t>una</a:t>
-            </a:r>
-            <a:r>
-              <a:rPr lang="en-US" sz="1400" dirty="0"/>
-              <a:t> </a:t>
-            </a:r>
-            <a:r>
-              <a:rPr lang="en-US" sz="1400" dirty="0" err="1"/>
-              <a:t>proprietà</a:t>
-            </a:r>
-            <a:r>
-              <a:rPr lang="en-US" sz="1400" dirty="0"/>
-              <a:t>, </a:t>
-            </a:r>
-            <a:r>
-              <a:rPr lang="en-US" sz="1400" dirty="0" err="1"/>
-              <a:t>ipotecare</a:t>
-            </a:r>
-            <a:r>
-              <a:rPr lang="en-US" sz="1400" dirty="0"/>
-              <a:t> </a:t>
-            </a:r>
-            <a:r>
-              <a:rPr lang="en-US" sz="1400" dirty="0" err="1"/>
-              <a:t>una</a:t>
-            </a:r>
-            <a:r>
-              <a:rPr lang="en-US" sz="1400" dirty="0"/>
-              <a:t> </a:t>
-            </a:r>
-            <a:r>
-              <a:rPr lang="en-US" sz="1400" dirty="0" err="1"/>
-              <a:t>proprietà</a:t>
-            </a:r>
-            <a:r>
-              <a:rPr lang="en-US" sz="1400" dirty="0"/>
-              <a:t>, </a:t>
-            </a:r>
-            <a:r>
-              <a:rPr lang="en-US" sz="1400" dirty="0" err="1"/>
-              <a:t>pagare</a:t>
-            </a:r>
-            <a:r>
-              <a:rPr lang="en-US" sz="1400" dirty="0"/>
-              <a:t> le tasse </a:t>
-            </a:r>
-            <a:r>
-              <a:rPr lang="en-US" sz="1400" dirty="0" err="1"/>
-              <a:t>agli</a:t>
-            </a:r>
-            <a:r>
-              <a:rPr lang="en-US" sz="1400" dirty="0"/>
-              <a:t> </a:t>
-            </a:r>
-            <a:r>
-              <a:rPr lang="en-US" sz="1400" dirty="0" err="1"/>
-              <a:t>altri</a:t>
-            </a:r>
-            <a:r>
-              <a:rPr lang="en-US" sz="1400" dirty="0"/>
-              <a:t> </a:t>
-            </a:r>
-            <a:r>
-              <a:rPr lang="en-US" sz="1400" dirty="0" err="1"/>
-              <a:t>giocatori</a:t>
-            </a:r>
-            <a:r>
-              <a:rPr lang="en-US" sz="1400" dirty="0"/>
-              <a:t>…</a:t>
+              <a:rPr lang="en-US" dirty="0" err="1"/>
+              <a:t>tra</a:t>
+            </a:r>
+            <a:r>
+              <a:rPr lang="en-US" dirty="0"/>
+              <a:t> il Client e il Server </a:t>
+            </a:r>
+            <a:r>
+              <a:rPr lang="en-US" dirty="0" err="1"/>
+              <a:t>sono</a:t>
+            </a:r>
+            <a:r>
+              <a:rPr lang="en-US" dirty="0"/>
+              <a:t> in </a:t>
+            </a:r>
+            <a:r>
+              <a:rPr lang="en-US" dirty="0" err="1"/>
+              <a:t>formato</a:t>
+            </a:r>
+            <a:r>
+              <a:rPr lang="en-US" dirty="0"/>
+              <a:t> CSV</a:t>
             </a:r>
           </a:p>
           <a:p>
@@ -6164,128 +6013,157 @@
               <a:buNone/>
             </a:pPr>
             <a:r>
-              <a:rPr lang="en-US" sz="1400" dirty="0" err="1"/>
-              <a:t>Tutto</a:t>
-            </a:r>
-            <a:r>
-              <a:rPr lang="en-US" sz="1400" dirty="0"/>
-              <a:t> il </a:t>
-            </a:r>
-            <a:r>
-              <a:rPr lang="en-US" sz="1400" dirty="0" err="1"/>
-              <a:t>codice</a:t>
-            </a:r>
-            <a:r>
-              <a:rPr lang="en-US" sz="1400" dirty="0"/>
-              <a:t> e la </a:t>
-            </a:r>
-            <a:r>
-              <a:rPr lang="en-US" sz="1400" dirty="0" err="1"/>
-              <a:t>spiegazione</a:t>
-            </a:r>
-            <a:r>
-              <a:rPr lang="en-US" sz="1400" dirty="0"/>
+              <a:rPr lang="en-US" dirty="0"/>
+              <a:t>Il client </a:t>
+            </a:r>
+            <a:r>
+              <a:rPr lang="en-US" dirty="0" err="1"/>
+              <a:t>usa</a:t>
+            </a:r>
+            <a:r>
+              <a:rPr lang="en-US" dirty="0"/>
+              <a:t> un </a:t>
+            </a:r>
+            <a:r>
+              <a:rPr lang="en-US" dirty="0" err="1"/>
+              <a:t>oggetto</a:t>
+            </a:r>
+            <a:r>
+              <a:rPr lang="en-US" dirty="0"/>
+              <a:t> di </a:t>
+            </a:r>
+            <a:r>
+              <a:rPr lang="en-US" dirty="0" err="1"/>
+              <a:t>tipo</a:t>
+            </a:r>
+            <a:r>
+              <a:rPr lang="en-US" dirty="0"/>
+              <a:t> Socket per </a:t>
+            </a:r>
+            <a:r>
+              <a:rPr lang="en-US" dirty="0" err="1"/>
+              <a:t>richiedere</a:t>
+            </a:r>
+            <a:r>
+              <a:rPr lang="en-US" dirty="0"/>
               <a:t> </a:t>
             </a:r>
             <a:r>
-              <a:rPr lang="en-US" sz="1400" dirty="0" err="1"/>
-              <a:t>su</a:t>
-            </a:r>
-            <a:r>
-              <a:rPr lang="en-US" sz="1400" dirty="0"/>
-              <a:t> come </a:t>
-            </a:r>
-            <a:r>
-              <a:rPr lang="en-US" sz="1400" dirty="0" err="1"/>
-              <a:t>avviarlo</a:t>
-            </a:r>
-            <a:r>
-              <a:rPr lang="en-US" sz="1400" dirty="0"/>
-              <a:t> è possible </a:t>
-            </a:r>
-            <a:r>
-              <a:rPr lang="en-US" sz="1400" dirty="0" err="1"/>
-              <a:t>trovarlo</a:t>
-            </a:r>
-            <a:r>
-              <a:rPr lang="en-US" sz="1400" dirty="0"/>
-              <a:t> in </a:t>
-            </a:r>
-            <a:r>
-              <a:rPr lang="en-US" sz="1400" dirty="0" err="1"/>
-              <a:t>questa</a:t>
-            </a:r>
-            <a:r>
-              <a:rPr lang="en-US" sz="1400" dirty="0"/>
+              <a:rPr lang="en-US" dirty="0" err="1"/>
+              <a:t>una</a:t>
+            </a:r>
+            <a:r>
+              <a:rPr lang="en-US" dirty="0"/>
               <a:t> </a:t>
             </a:r>
             <a:r>
-              <a:rPr lang="en-US" sz="1400" dirty="0" err="1"/>
-              <a:t>pagina</a:t>
-            </a:r>
-            <a:r>
-              <a:rPr lang="en-US" sz="1400" dirty="0"/>
-              <a:t>:  </a:t>
-            </a:r>
-            <a:r>
-              <a:rPr lang="en-US" sz="1400" dirty="0">
-                <a:hlinkClick r:id="rId2"/>
-              </a:rPr>
-              <a:t>https://github.com/MirkoMolteni/MonopolyJava</a:t>
-            </a:r>
-            <a:endParaRPr lang="it-IT" sz="1400" dirty="0"/>
+              <a:rPr lang="en-US" dirty="0" err="1"/>
+              <a:t>connessione</a:t>
+            </a:r>
+            <a:r>
+              <a:rPr lang="en-US" dirty="0"/>
+              <a:t> al server. Il server per </a:t>
+            </a:r>
+            <a:r>
+              <a:rPr lang="en-US" dirty="0" err="1"/>
+              <a:t>accettare</a:t>
+            </a:r>
+            <a:r>
+              <a:rPr lang="en-US" dirty="0"/>
+              <a:t> le </a:t>
+            </a:r>
+            <a:r>
+              <a:rPr lang="en-US" dirty="0" err="1"/>
+              <a:t>connessione</a:t>
+            </a:r>
+            <a:r>
+              <a:rPr lang="en-US" dirty="0"/>
+              <a:t> da </a:t>
+            </a:r>
+            <a:r>
+              <a:rPr lang="en-US" dirty="0" err="1"/>
+              <a:t>parte</a:t>
+            </a:r>
+            <a:r>
+              <a:rPr lang="en-US" dirty="0"/>
+              <a:t> </a:t>
+            </a:r>
+            <a:r>
+              <a:rPr lang="en-US" dirty="0" err="1"/>
+              <a:t>dei</a:t>
+            </a:r>
+            <a:r>
+              <a:rPr lang="en-US" dirty="0"/>
+              <a:t> client </a:t>
+            </a:r>
+            <a:r>
+              <a:rPr lang="en-US" dirty="0" err="1"/>
+              <a:t>usa</a:t>
+            </a:r>
+            <a:r>
+              <a:rPr lang="en-US" dirty="0"/>
+              <a:t> un </a:t>
+            </a:r>
+            <a:r>
+              <a:rPr lang="en-US" dirty="0" err="1"/>
+              <a:t>oggetto</a:t>
+            </a:r>
+            <a:r>
+              <a:rPr lang="en-US" dirty="0"/>
+              <a:t> </a:t>
+            </a:r>
+            <a:r>
+              <a:rPr lang="en-US" dirty="0" err="1"/>
+              <a:t>ServerSocket</a:t>
+            </a:r>
+            <a:r>
+              <a:rPr lang="en-US" dirty="0"/>
+              <a:t>.</a:t>
+            </a:r>
+            <a:endParaRPr lang="it-IT" dirty="0"/>
           </a:p>
         </p:txBody>
       </p:sp>
       <p:pic>
         <p:nvPicPr>
-          <p:cNvPr id="4098" name="Picture 2" descr="Logo Di Vettore Dell'estratto Del Segno Di Spunta Dell'ingranaggio  Illustrazione Vettoriale - Illustrazione di ingegneria, certificato:  89817893">
-            <a:extLst>
-              <a:ext uri="{FF2B5EF4-FFF2-40B4-BE49-F238E27FC236}">
-                <a16:creationId xmlns:a16="http://schemas.microsoft.com/office/drawing/2014/main" id="{D020D30A-4CC9-D0BB-012A-83C7D4CDCA8E}"/>
+          <p:cNvPr id="13" name="Immagine 12" descr="Immagine che contiene Elementi grafici, simbolo, Carattere, logo&#10;&#10;Descrizione generata automaticamente">
+            <a:extLst>
+              <a:ext uri="{FF2B5EF4-FFF2-40B4-BE49-F238E27FC236}">
+                <a16:creationId xmlns:a16="http://schemas.microsoft.com/office/drawing/2014/main" id="{C86D32C4-4BA5-C3C9-13AE-F39E157CC2EE}"/>
               </a:ext>
             </a:extLst>
           </p:cNvPr>
           <p:cNvPicPr>
-            <a:picLocks noChangeAspect="1" noChangeArrowheads="1"/>
+            <a:picLocks noChangeAspect="1"/>
           </p:cNvPicPr>
           <p:nvPr/>
         </p:nvPicPr>
-        <p:blipFill rotWithShape="1">
-          <a:blip r:embed="rId3">
+        <p:blipFill>
+          <a:blip r:embed="rId2">
             <a:extLst>
               <a:ext uri="{28A0092B-C50C-407E-A947-70E740481C1C}">
                 <a14:useLocalDpi xmlns:a14="http://schemas.microsoft.com/office/drawing/2010/main" val="0"/>
               </a:ext>
             </a:extLst>
           </a:blip>
-          <a:srcRect l="5659" r="5504" b="-3"/>
-          <a:stretch/>
+          <a:stretch>
+            <a:fillRect/>
+          </a:stretch>
         </p:blipFill>
-        <p:spPr bwMode="auto">
-          <a:xfrm>
-            <a:off x="6096000" y="-16591"/>
-            <a:ext cx="6107073" cy="6874591"/>
+        <p:spPr>
+          <a:xfrm>
+            <a:off x="8305799" y="1969097"/>
+            <a:ext cx="2993571" cy="2993571"/>
           </a:xfrm>
           <a:prstGeom prst="rect">
             <a:avLst/>
           </a:prstGeom>
-          <a:noFill/>
-          <a:extLst>
-            <a:ext uri="{909E8E84-426E-40DD-AFC4-6F175D3DCCD1}">
-              <a14:hiddenFill xmlns:a14="http://schemas.microsoft.com/office/drawing/2010/main">
-                <a:solidFill>
-                  <a:srgbClr val="FFFFFF"/>
-                </a:solidFill>
-              </a14:hiddenFill>
-            </a:ext>
-          </a:extLst>
         </p:spPr>
       </p:pic>
     </p:spTree>
     <p:extLst>
       <p:ext uri="{BB962C8B-B14F-4D97-AF65-F5344CB8AC3E}">
-        <p14:creationId xmlns:p14="http://schemas.microsoft.com/office/powerpoint/2010/main" val="1772000084"/>
+        <p14:creationId xmlns:p14="http://schemas.microsoft.com/office/powerpoint/2010/main" val="2114049754"/>
       </p:ext>
     </p:extLst>
   </p:cSld>
@@ -6301,559 +6179,10 @@
     <p:bg>
       <p:bgPr>
         <a:solidFill>
-          <a:schemeClr val="bg1">
-            <a:lumMod val="85000"/>
-            <a:lumOff val="15000"/>
+          <a:schemeClr val="bg2">
+            <a:lumMod val="75000"/>
+            <a:lumOff val="25000"/>
           </a:schemeClr>
-        </a:solidFill>
-        <a:effectLst/>
-      </p:bgPr>
-    </p:bg>
-    <p:spTree>
-      <p:nvGrpSpPr>
-        <p:cNvPr id="1" name=""/>
-        <p:cNvGrpSpPr/>
-        <p:nvPr/>
-      </p:nvGrpSpPr>
-      <p:grpSpPr>
-        <a:xfrm>
-          <a:off x="0" y="0"/>
-          <a:ext cx="0" cy="0"/>
-          <a:chOff x="0" y="0"/>
-          <a:chExt cx="0" cy="0"/>
-        </a:xfrm>
-      </p:grpSpPr>
-      <p:sp useBgFill="1">
-        <p:nvSpPr>
-          <p:cNvPr id="32" name="Rectangle 27">
-            <a:extLst>
-              <a:ext uri="{FF2B5EF4-FFF2-40B4-BE49-F238E27FC236}">
-                <a16:creationId xmlns:a16="http://schemas.microsoft.com/office/drawing/2014/main" id="{BF02845A-8571-40C5-9F56-8F9B3F7C4E4C}"/>
-              </a:ext>
-              <a:ext uri="{C183D7F6-B498-43B3-948B-1728B52AA6E4}">
-                <adec:decorative xmlns:adec="http://schemas.microsoft.com/office/drawing/2017/decorative" val="1"/>
-              </a:ext>
-            </a:extLst>
-          </p:cNvPr>
-          <p:cNvSpPr>
-            <a:spLocks noGrp="1" noRot="1" noChangeAspect="1" noMove="1" noResize="1" noEditPoints="1" noAdjustHandles="1" noChangeArrowheads="1" noChangeShapeType="1" noTextEdit="1"/>
-          </p:cNvSpPr>
-          <p:nvPr>
-            <p:extLst>
-              <p:ext uri="{386F3935-93C4-4BCD-93E2-E3B085C9AB24}">
-                <p16:designElem xmlns:p16="http://schemas.microsoft.com/office/powerpoint/2015/main" val="1"/>
-              </p:ext>
-            </p:extLst>
-          </p:nvPr>
-        </p:nvSpPr>
-        <p:spPr>
-          <a:xfrm>
-            <a:off x="0" y="0"/>
-            <a:ext cx="12192000" cy="6858000"/>
-          </a:xfrm>
-          <a:prstGeom prst="rect">
-            <a:avLst/>
-          </a:prstGeom>
-          <a:ln w="12700" cap="flat" cmpd="sng" algn="ctr">
-            <a:noFill/>
-            <a:prstDash val="solid"/>
-            <a:miter lim="800000"/>
-          </a:ln>
-          <a:effectLst/>
-          <a:extLst>
-            <a:ext uri="{91240B29-F687-4F45-9708-019B960494DF}">
-              <a14:hiddenLine xmlns:a14="http://schemas.microsoft.com/office/drawing/2010/main" w="12700" cap="flat" cmpd="sng" algn="ctr">
-                <a:solidFill>
-                  <a:schemeClr val="accent1">
-                    <a:shade val="50000"/>
-                  </a:schemeClr>
-                </a:solidFill>
-                <a:prstDash val="solid"/>
-                <a:miter lim="800000"/>
-              </a14:hiddenLine>
-            </a:ext>
-          </a:extLst>
-        </p:spPr>
-        <p:style>
-          <a:lnRef idx="2">
-            <a:schemeClr val="accent1">
-              <a:shade val="50000"/>
-            </a:schemeClr>
-          </a:lnRef>
-          <a:fillRef idx="1">
-            <a:schemeClr val="accent1"/>
-          </a:fillRef>
-          <a:effectRef idx="0">
-            <a:schemeClr val="accent1"/>
-          </a:effectRef>
-          <a:fontRef idx="minor">
-            <a:schemeClr val="lt1"/>
-          </a:fontRef>
-        </p:style>
-        <p:txBody>
-          <a:bodyPr rtlCol="0" anchor="ctr"/>
-          <a:lstStyle/>
-          <a:p>
-            <a:pPr algn="ctr"/>
-            <a:endParaRPr lang="en-US"/>
-          </a:p>
-        </p:txBody>
-      </p:sp>
-      <p:sp>
-        <p:nvSpPr>
-          <p:cNvPr id="2" name="Titolo 1">
-            <a:extLst>
-              <a:ext uri="{FF2B5EF4-FFF2-40B4-BE49-F238E27FC236}">
-                <a16:creationId xmlns:a16="http://schemas.microsoft.com/office/drawing/2014/main" id="{E1E8E791-D125-68A5-62B9-4D794991B797}"/>
-              </a:ext>
-            </a:extLst>
-          </p:cNvPr>
-          <p:cNvSpPr>
-            <a:spLocks noGrp="1"/>
-          </p:cNvSpPr>
-          <p:nvPr>
-            <p:ph type="title"/>
-          </p:nvPr>
-        </p:nvSpPr>
-        <p:spPr>
-          <a:xfrm>
-            <a:off x="784915" y="895441"/>
-            <a:ext cx="6796985" cy="1553846"/>
-          </a:xfrm>
-        </p:spPr>
-        <p:txBody>
-          <a:bodyPr>
-            <a:normAutofit/>
-          </a:bodyPr>
-          <a:lstStyle/>
-          <a:p>
-            <a:r>
-              <a:rPr lang="en-US"/>
-              <a:t>Tecniche</a:t>
-            </a:r>
-            <a:r>
-              <a:rPr lang="en-US" dirty="0"/>
-              <a:t> </a:t>
-            </a:r>
-            <a:r>
-              <a:rPr lang="en-US"/>
-              <a:t>utilizzate</a:t>
-            </a:r>
-            <a:endParaRPr lang="it-IT" dirty="0"/>
-          </a:p>
-        </p:txBody>
-      </p:sp>
-      <p:cxnSp>
-        <p:nvCxnSpPr>
-          <p:cNvPr id="33" name="Straight Connector 29">
-            <a:extLst>
-              <a:ext uri="{FF2B5EF4-FFF2-40B4-BE49-F238E27FC236}">
-                <a16:creationId xmlns:a16="http://schemas.microsoft.com/office/drawing/2014/main" id="{F30BB598-81B4-41BB-BC44-CD9C29AE2EAB}"/>
-              </a:ext>
-              <a:ext uri="{C183D7F6-B498-43B3-948B-1728B52AA6E4}">
-                <adec:decorative xmlns:adec="http://schemas.microsoft.com/office/drawing/2017/decorative" val="1"/>
-              </a:ext>
-            </a:extLst>
-          </p:cNvPr>
-          <p:cNvCxnSpPr>
-            <a:cxnSpLocks noGrp="1" noRot="1" noChangeAspect="1" noMove="1" noResize="1" noEditPoints="1" noAdjustHandles="1" noChangeArrowheads="1" noChangeShapeType="1"/>
-          </p:cNvCxnSpPr>
-          <p:nvPr>
-            <p:extLst>
-              <p:ext uri="{386F3935-93C4-4BCD-93E2-E3B085C9AB24}">
-                <p16:designElem xmlns:p16="http://schemas.microsoft.com/office/powerpoint/2015/main" val="1"/>
-              </p:ext>
-            </p:extLst>
-          </p:nvPr>
-        </p:nvCxnSpPr>
-        <p:spPr>
-          <a:xfrm>
-            <a:off x="952500" y="2762794"/>
-            <a:ext cx="0" cy="3292672"/>
-          </a:xfrm>
-          <a:prstGeom prst="line">
-            <a:avLst/>
-          </a:prstGeom>
-          <a:ln w="10795">
-            <a:solidFill>
-              <a:schemeClr val="tx2"/>
-            </a:solidFill>
-          </a:ln>
-        </p:spPr>
-        <p:style>
-          <a:lnRef idx="1">
-            <a:schemeClr val="accent1"/>
-          </a:lnRef>
-          <a:fillRef idx="0">
-            <a:schemeClr val="accent1"/>
-          </a:fillRef>
-          <a:effectRef idx="0">
-            <a:schemeClr val="accent1"/>
-          </a:effectRef>
-          <a:fontRef idx="minor">
-            <a:schemeClr val="tx1"/>
-          </a:fontRef>
-        </p:style>
-      </p:cxnSp>
-      <p:sp>
-        <p:nvSpPr>
-          <p:cNvPr id="3" name="Segnaposto contenuto 2">
-            <a:extLst>
-              <a:ext uri="{FF2B5EF4-FFF2-40B4-BE49-F238E27FC236}">
-                <a16:creationId xmlns:a16="http://schemas.microsoft.com/office/drawing/2014/main" id="{65838E50-B752-B3CC-062F-F0D9607079D5}"/>
-              </a:ext>
-            </a:extLst>
-          </p:cNvPr>
-          <p:cNvSpPr>
-            <a:spLocks noGrp="1"/>
-          </p:cNvSpPr>
-          <p:nvPr>
-            <p:ph idx="1"/>
-          </p:nvPr>
-        </p:nvSpPr>
-        <p:spPr>
-          <a:xfrm>
-            <a:off x="1572638" y="2750172"/>
-            <a:ext cx="6009262" cy="3388968"/>
-          </a:xfrm>
-        </p:spPr>
-        <p:txBody>
-          <a:bodyPr anchor="b">
-            <a:normAutofit/>
-          </a:bodyPr>
-          <a:lstStyle/>
-          <a:p>
-            <a:pPr marL="0" indent="0">
-              <a:lnSpc>
-                <a:spcPct val="110000"/>
-              </a:lnSpc>
-              <a:buNone/>
-            </a:pPr>
-            <a:r>
-              <a:rPr lang="en-US" dirty="0"/>
-              <a:t>Il </a:t>
-            </a:r>
-            <a:r>
-              <a:rPr lang="en-US" dirty="0" err="1"/>
-              <a:t>programma</a:t>
-            </a:r>
-            <a:r>
-              <a:rPr lang="en-US" dirty="0"/>
-              <a:t> è </a:t>
-            </a:r>
-            <a:r>
-              <a:rPr lang="en-US" dirty="0" err="1"/>
-              <a:t>costituito</a:t>
-            </a:r>
-            <a:r>
-              <a:rPr lang="en-US" dirty="0"/>
-              <a:t> da </a:t>
-            </a:r>
-            <a:r>
-              <a:rPr lang="en-US" dirty="0" err="1"/>
-              <a:t>dei</a:t>
-            </a:r>
-            <a:r>
-              <a:rPr lang="en-US" dirty="0"/>
-              <a:t> Client </a:t>
-            </a:r>
-            <a:r>
-              <a:rPr lang="en-US" dirty="0" err="1"/>
-              <a:t>che</a:t>
-            </a:r>
-            <a:r>
-              <a:rPr lang="en-US" dirty="0"/>
-              <a:t> </a:t>
-            </a:r>
-            <a:r>
-              <a:rPr lang="en-US" dirty="0" err="1"/>
-              <a:t>comunicano</a:t>
-            </a:r>
-            <a:r>
-              <a:rPr lang="en-US" dirty="0"/>
-              <a:t> con il Server per </a:t>
-            </a:r>
-            <a:r>
-              <a:rPr lang="en-US" dirty="0" err="1"/>
-              <a:t>giocare</a:t>
-            </a:r>
-            <a:endParaRPr lang="en-US" dirty="0"/>
-          </a:p>
-          <a:p>
-            <a:pPr marL="0" indent="0">
-              <a:lnSpc>
-                <a:spcPct val="110000"/>
-              </a:lnSpc>
-              <a:buNone/>
-            </a:pPr>
-            <a:r>
-              <a:rPr lang="en-US" dirty="0"/>
-              <a:t>Questa </a:t>
-            </a:r>
-            <a:r>
-              <a:rPr lang="en-US" dirty="0" err="1"/>
-              <a:t>comunicazione</a:t>
-            </a:r>
-            <a:r>
-              <a:rPr lang="en-US" dirty="0"/>
-              <a:t> è </a:t>
-            </a:r>
-            <a:r>
-              <a:rPr lang="en-US" dirty="0" err="1"/>
-              <a:t>basata</a:t>
-            </a:r>
-            <a:r>
-              <a:rPr lang="en-US" dirty="0"/>
-              <a:t> </a:t>
-            </a:r>
-            <a:r>
-              <a:rPr lang="en-US" dirty="0" err="1"/>
-              <a:t>su</a:t>
-            </a:r>
-            <a:r>
-              <a:rPr lang="en-US" dirty="0"/>
-              <a:t> TCP, e </a:t>
-            </a:r>
-            <a:r>
-              <a:rPr lang="en-US" dirty="0" err="1"/>
-              <a:t>i</a:t>
-            </a:r>
-            <a:r>
-              <a:rPr lang="en-US" dirty="0"/>
-              <a:t> </a:t>
-            </a:r>
-            <a:r>
-              <a:rPr lang="en-US" dirty="0" err="1"/>
-              <a:t>messaggi</a:t>
-            </a:r>
-            <a:r>
-              <a:rPr lang="en-US" dirty="0"/>
-              <a:t> </a:t>
-            </a:r>
-            <a:r>
-              <a:rPr lang="en-US" dirty="0" err="1"/>
-              <a:t>che</a:t>
-            </a:r>
-            <a:r>
-              <a:rPr lang="en-US" dirty="0"/>
-              <a:t> </a:t>
-            </a:r>
-            <a:r>
-              <a:rPr lang="en-US" dirty="0" err="1"/>
-              <a:t>vengono</a:t>
-            </a:r>
-            <a:r>
-              <a:rPr lang="en-US" dirty="0"/>
-              <a:t> </a:t>
-            </a:r>
-            <a:r>
-              <a:rPr lang="en-US" dirty="0" err="1"/>
-              <a:t>inviati</a:t>
-            </a:r>
-            <a:r>
-              <a:rPr lang="en-US" dirty="0"/>
-              <a:t> </a:t>
-            </a:r>
-            <a:r>
-              <a:rPr lang="en-US" dirty="0" err="1"/>
-              <a:t>tra</a:t>
-            </a:r>
-            <a:r>
-              <a:rPr lang="en-US" dirty="0"/>
-              <a:t> il Client e il Server </a:t>
-            </a:r>
-            <a:r>
-              <a:rPr lang="en-US" dirty="0" err="1"/>
-              <a:t>sono</a:t>
-            </a:r>
-            <a:r>
-              <a:rPr lang="en-US" dirty="0"/>
-              <a:t> in </a:t>
-            </a:r>
-            <a:r>
-              <a:rPr lang="en-US" dirty="0" err="1"/>
-              <a:t>formato</a:t>
-            </a:r>
-            <a:r>
-              <a:rPr lang="en-US" dirty="0"/>
-              <a:t> CSV</a:t>
-            </a:r>
-          </a:p>
-          <a:p>
-            <a:pPr marL="0" indent="0">
-              <a:lnSpc>
-                <a:spcPct val="110000"/>
-              </a:lnSpc>
-              <a:buNone/>
-            </a:pPr>
-            <a:r>
-              <a:rPr lang="en-US" dirty="0"/>
-              <a:t>Il client </a:t>
-            </a:r>
-            <a:r>
-              <a:rPr lang="en-US" dirty="0" err="1"/>
-              <a:t>usa</a:t>
-            </a:r>
-            <a:r>
-              <a:rPr lang="en-US" dirty="0"/>
-              <a:t> un </a:t>
-            </a:r>
-            <a:r>
-              <a:rPr lang="en-US" dirty="0" err="1"/>
-              <a:t>oggetto</a:t>
-            </a:r>
-            <a:r>
-              <a:rPr lang="en-US" dirty="0"/>
-              <a:t> di </a:t>
-            </a:r>
-            <a:r>
-              <a:rPr lang="en-US" dirty="0" err="1"/>
-              <a:t>tipo</a:t>
-            </a:r>
-            <a:r>
-              <a:rPr lang="en-US" dirty="0"/>
-              <a:t> Socket per </a:t>
-            </a:r>
-            <a:r>
-              <a:rPr lang="en-US" dirty="0" err="1"/>
-              <a:t>richiedere</a:t>
-            </a:r>
-            <a:r>
-              <a:rPr lang="en-US" dirty="0"/>
-              <a:t> </a:t>
-            </a:r>
-            <a:r>
-              <a:rPr lang="en-US" dirty="0" err="1"/>
-              <a:t>una</a:t>
-            </a:r>
-            <a:r>
-              <a:rPr lang="en-US" dirty="0"/>
-              <a:t> </a:t>
-            </a:r>
-            <a:r>
-              <a:rPr lang="en-US" dirty="0" err="1"/>
-              <a:t>connessione</a:t>
-            </a:r>
-            <a:r>
-              <a:rPr lang="en-US" dirty="0"/>
-              <a:t> al server. Il server per </a:t>
-            </a:r>
-            <a:r>
-              <a:rPr lang="en-US" dirty="0" err="1"/>
-              <a:t>accettare</a:t>
-            </a:r>
-            <a:r>
-              <a:rPr lang="en-US" dirty="0"/>
-              <a:t> le </a:t>
-            </a:r>
-            <a:r>
-              <a:rPr lang="en-US" dirty="0" err="1"/>
-              <a:t>connessione</a:t>
-            </a:r>
-            <a:r>
-              <a:rPr lang="en-US" dirty="0"/>
-              <a:t> da </a:t>
-            </a:r>
-            <a:r>
-              <a:rPr lang="en-US" dirty="0" err="1"/>
-              <a:t>parte</a:t>
-            </a:r>
-            <a:r>
-              <a:rPr lang="en-US" dirty="0"/>
-              <a:t> </a:t>
-            </a:r>
-            <a:r>
-              <a:rPr lang="en-US" dirty="0" err="1"/>
-              <a:t>dei</a:t>
-            </a:r>
-            <a:r>
-              <a:rPr lang="en-US" dirty="0"/>
-              <a:t> client </a:t>
-            </a:r>
-            <a:r>
-              <a:rPr lang="en-US" dirty="0" err="1"/>
-              <a:t>usa</a:t>
-            </a:r>
-            <a:r>
-              <a:rPr lang="en-US" dirty="0"/>
-              <a:t> un </a:t>
-            </a:r>
-            <a:r>
-              <a:rPr lang="en-US" dirty="0" err="1"/>
-              <a:t>oggetto</a:t>
-            </a:r>
-            <a:r>
-              <a:rPr lang="en-US" dirty="0"/>
-              <a:t> </a:t>
-            </a:r>
-            <a:r>
-              <a:rPr lang="en-US" dirty="0" err="1"/>
-              <a:t>ServerSocket</a:t>
-            </a:r>
-            <a:r>
-              <a:rPr lang="en-US" dirty="0"/>
-              <a:t>.</a:t>
-            </a:r>
-            <a:endParaRPr lang="it-IT" dirty="0"/>
-          </a:p>
-        </p:txBody>
-      </p:sp>
-      <p:pic>
-        <p:nvPicPr>
-          <p:cNvPr id="13" name="Immagine 12" descr="Immagine che contiene Elementi grafici, simbolo, Carattere, logo&#10;&#10;Descrizione generata automaticamente">
-            <a:extLst>
-              <a:ext uri="{FF2B5EF4-FFF2-40B4-BE49-F238E27FC236}">
-                <a16:creationId xmlns:a16="http://schemas.microsoft.com/office/drawing/2014/main" id="{C86D32C4-4BA5-C3C9-13AE-F39E157CC2EE}"/>
-              </a:ext>
-            </a:extLst>
-          </p:cNvPr>
-          <p:cNvPicPr>
-            <a:picLocks noChangeAspect="1"/>
-          </p:cNvPicPr>
-          <p:nvPr/>
-        </p:nvPicPr>
-        <p:blipFill>
-          <a:blip r:embed="rId2">
-            <a:extLst>
-              <a:ext uri="{28A0092B-C50C-407E-A947-70E740481C1C}">
-                <a14:useLocalDpi xmlns:a14="http://schemas.microsoft.com/office/drawing/2010/main" val="0"/>
-              </a:ext>
-            </a:extLst>
-          </a:blip>
-          <a:stretch>
-            <a:fillRect/>
-          </a:stretch>
-        </p:blipFill>
-        <p:spPr>
-          <a:xfrm>
-            <a:off x="8305799" y="1969097"/>
-            <a:ext cx="2993571" cy="2993571"/>
-          </a:xfrm>
-          <a:prstGeom prst="rect">
-            <a:avLst/>
-          </a:prstGeom>
-        </p:spPr>
-      </p:pic>
-    </p:spTree>
-    <p:extLst>
-      <p:ext uri="{BB962C8B-B14F-4D97-AF65-F5344CB8AC3E}">
-        <p14:creationId xmlns:p14="http://schemas.microsoft.com/office/powerpoint/2010/main" val="2114049754"/>
-      </p:ext>
-    </p:extLst>
-  </p:cSld>
-  <p:clrMapOvr>
-    <a:masterClrMapping/>
-  </p:clrMapOvr>
-</p:sld>
-</file>
-
-<file path=ppt/slides/slide6.xml><?xml version="1.0" encoding="utf-8"?>
-<p:sld xmlns:a="http://schemas.openxmlformats.org/drawingml/2006/main" xmlns:r="http://schemas.openxmlformats.org/officeDocument/2006/relationships" xmlns:p="http://schemas.openxmlformats.org/presentationml/2006/main">
-  <p:cSld>
-    <p:bg>
-      <p:bgPr>
-        <a:solidFill>
-          <a:schemeClr val="bg2"/>
         </a:solidFill>
         <a:effectLst/>
       </p:bgPr>
@@ -7206,13 +6535,16 @@
 </p:sld>
 </file>
 
-<file path=ppt/slides/slide7.xml><?xml version="1.0" encoding="utf-8"?>
+<file path=ppt/slides/slide6.xml><?xml version="1.0" encoding="utf-8"?>
 <p:sld xmlns:a="http://schemas.openxmlformats.org/drawingml/2006/main" xmlns:r="http://schemas.openxmlformats.org/officeDocument/2006/relationships" xmlns:p="http://schemas.openxmlformats.org/presentationml/2006/main">
   <p:cSld>
     <p:bg>
       <p:bgPr>
         <a:solidFill>
-          <a:schemeClr val="bg2"/>
+          <a:schemeClr val="bg2">
+            <a:lumMod val="75000"/>
+            <a:lumOff val="25000"/>
+          </a:schemeClr>
         </a:solidFill>
         <a:effectLst/>
       </p:bgPr>
@@ -7650,13 +6982,16 @@
 </p:sld>
 </file>
 
-<file path=ppt/slides/slide8.xml><?xml version="1.0" encoding="utf-8"?>
+<file path=ppt/slides/slide7.xml><?xml version="1.0" encoding="utf-8"?>
 <p:sld xmlns:a="http://schemas.openxmlformats.org/drawingml/2006/main" xmlns:r="http://schemas.openxmlformats.org/officeDocument/2006/relationships" xmlns:p="http://schemas.openxmlformats.org/presentationml/2006/main">
   <p:cSld>
     <p:bg>
       <p:bgPr>
         <a:solidFill>
-          <a:schemeClr val="bg2"/>
+          <a:schemeClr val="bg2">
+            <a:lumMod val="75000"/>
+            <a:lumOff val="25000"/>
+          </a:schemeClr>
         </a:solidFill>
         <a:effectLst/>
       </p:bgPr>
@@ -7882,15 +7217,15 @@
 </p:sld>
 </file>
 
-<file path=ppt/slides/slide9.xml><?xml version="1.0" encoding="utf-8"?>
+<file path=ppt/slides/slide8.xml><?xml version="1.0" encoding="utf-8"?>
 <p:sld xmlns:a="http://schemas.openxmlformats.org/drawingml/2006/main" xmlns:r="http://schemas.openxmlformats.org/officeDocument/2006/relationships" xmlns:p="http://schemas.openxmlformats.org/presentationml/2006/main">
   <p:cSld>
     <p:bg>
       <p:bgPr>
         <a:solidFill>
-          <a:schemeClr val="bg1">
-            <a:lumMod val="85000"/>
-            <a:lumOff val="15000"/>
+          <a:schemeClr val="bg2">
+            <a:lumMod val="75000"/>
+            <a:lumOff val="25000"/>
           </a:schemeClr>
         </a:solidFill>
         <a:effectLst/>
@@ -8108,6 +7443,302 @@
     <p:extLst>
       <p:ext uri="{BB962C8B-B14F-4D97-AF65-F5344CB8AC3E}">
         <p14:creationId xmlns:p14="http://schemas.microsoft.com/office/powerpoint/2010/main" val="446146577"/>
+      </p:ext>
+    </p:extLst>
+  </p:cSld>
+  <p:clrMapOvr>
+    <a:masterClrMapping/>
+  </p:clrMapOvr>
+</p:sld>
+</file>
+
+<file path=ppt/slides/slide9.xml><?xml version="1.0" encoding="utf-8"?>
+<p:sld xmlns:a="http://schemas.openxmlformats.org/drawingml/2006/main" xmlns:r="http://schemas.openxmlformats.org/officeDocument/2006/relationships" xmlns:p="http://schemas.openxmlformats.org/presentationml/2006/main">
+  <p:cSld>
+    <p:bg>
+      <p:bgPr>
+        <a:solidFill>
+          <a:schemeClr val="bg2">
+            <a:lumMod val="75000"/>
+            <a:lumOff val="25000"/>
+          </a:schemeClr>
+        </a:solidFill>
+        <a:effectLst/>
+      </p:bgPr>
+    </p:bg>
+    <p:spTree>
+      <p:nvGrpSpPr>
+        <p:cNvPr id="1" name=""/>
+        <p:cNvGrpSpPr/>
+        <p:nvPr/>
+      </p:nvGrpSpPr>
+      <p:grpSpPr>
+        <a:xfrm>
+          <a:off x="0" y="0"/>
+          <a:ext cx="0" cy="0"/>
+          <a:chOff x="0" y="0"/>
+          <a:chExt cx="0" cy="0"/>
+        </a:xfrm>
+      </p:grpSpPr>
+      <p:sp useBgFill="1">
+        <p:nvSpPr>
+          <p:cNvPr id="12" name="Rectangle 11">
+            <a:extLst>
+              <a:ext uri="{FF2B5EF4-FFF2-40B4-BE49-F238E27FC236}">
+                <a16:creationId xmlns:a16="http://schemas.microsoft.com/office/drawing/2014/main" id="{BF02845A-8571-40C5-9F56-8F9B3F7C4E4C}"/>
+              </a:ext>
+              <a:ext uri="{C183D7F6-B498-43B3-948B-1728B52AA6E4}">
+                <adec:decorative xmlns:adec="http://schemas.microsoft.com/office/drawing/2017/decorative" val="1"/>
+              </a:ext>
+            </a:extLst>
+          </p:cNvPr>
+          <p:cNvSpPr>
+            <a:spLocks noGrp="1" noRot="1" noChangeAspect="1" noMove="1" noResize="1" noEditPoints="1" noAdjustHandles="1" noChangeArrowheads="1" noChangeShapeType="1" noTextEdit="1"/>
+          </p:cNvSpPr>
+          <p:nvPr>
+            <p:extLst>
+              <p:ext uri="{386F3935-93C4-4BCD-93E2-E3B085C9AB24}">
+                <p16:designElem xmlns:p16="http://schemas.microsoft.com/office/powerpoint/2015/main" val="1"/>
+              </p:ext>
+            </p:extLst>
+          </p:nvPr>
+        </p:nvSpPr>
+        <p:spPr>
+          <a:xfrm>
+            <a:off x="0" y="0"/>
+            <a:ext cx="12192000" cy="6858000"/>
+          </a:xfrm>
+          <a:prstGeom prst="rect">
+            <a:avLst/>
+          </a:prstGeom>
+          <a:ln w="12700" cap="flat" cmpd="sng" algn="ctr">
+            <a:noFill/>
+            <a:prstDash val="solid"/>
+            <a:miter lim="800000"/>
+          </a:ln>
+          <a:effectLst/>
+          <a:extLst>
+            <a:ext uri="{91240B29-F687-4F45-9708-019B960494DF}">
+              <a14:hiddenLine xmlns:a14="http://schemas.microsoft.com/office/drawing/2010/main" w="12700" cap="flat" cmpd="sng" algn="ctr">
+                <a:solidFill>
+                  <a:schemeClr val="accent1">
+                    <a:shade val="50000"/>
+                  </a:schemeClr>
+                </a:solidFill>
+                <a:prstDash val="solid"/>
+                <a:miter lim="800000"/>
+              </a14:hiddenLine>
+            </a:ext>
+          </a:extLst>
+        </p:spPr>
+        <p:style>
+          <a:lnRef idx="2">
+            <a:schemeClr val="accent1">
+              <a:shade val="50000"/>
+            </a:schemeClr>
+          </a:lnRef>
+          <a:fillRef idx="1">
+            <a:schemeClr val="accent1"/>
+          </a:fillRef>
+          <a:effectRef idx="0">
+            <a:schemeClr val="accent1"/>
+          </a:effectRef>
+          <a:fontRef idx="minor">
+            <a:schemeClr val="lt1"/>
+          </a:fontRef>
+        </p:style>
+        <p:txBody>
+          <a:bodyPr rtlCol="0" anchor="ctr"/>
+          <a:lstStyle/>
+          <a:p>
+            <a:pPr algn="ctr"/>
+            <a:endParaRPr lang="en-US"/>
+          </a:p>
+        </p:txBody>
+      </p:sp>
+      <p:sp>
+        <p:nvSpPr>
+          <p:cNvPr id="2" name="Titolo 1">
+            <a:extLst>
+              <a:ext uri="{FF2B5EF4-FFF2-40B4-BE49-F238E27FC236}">
+                <a16:creationId xmlns:a16="http://schemas.microsoft.com/office/drawing/2014/main" id="{3799425E-88AC-9A32-5961-19DA0155272E}"/>
+              </a:ext>
+            </a:extLst>
+          </p:cNvPr>
+          <p:cNvSpPr>
+            <a:spLocks noGrp="1"/>
+          </p:cNvSpPr>
+          <p:nvPr>
+            <p:ph type="title"/>
+          </p:nvPr>
+        </p:nvSpPr>
+        <p:spPr>
+          <a:xfrm>
+            <a:off x="3811296" y="-281566"/>
+            <a:ext cx="4569407" cy="1560083"/>
+          </a:xfrm>
+        </p:spPr>
+        <p:txBody>
+          <a:bodyPr>
+            <a:normAutofit/>
+          </a:bodyPr>
+          <a:lstStyle/>
+          <a:p>
+            <a:pPr algn="ctr"/>
+            <a:r>
+              <a:rPr lang="en-US" dirty="0"/>
+              <a:t>Class diagram</a:t>
+            </a:r>
+            <a:endParaRPr lang="it-IT" dirty="0"/>
+          </a:p>
+        </p:txBody>
+      </p:sp>
+      <p:cxnSp>
+        <p:nvCxnSpPr>
+          <p:cNvPr id="14" name="Straight Connector 13">
+            <a:extLst>
+              <a:ext uri="{FF2B5EF4-FFF2-40B4-BE49-F238E27FC236}">
+                <a16:creationId xmlns:a16="http://schemas.microsoft.com/office/drawing/2014/main" id="{F30BB598-81B4-41BB-BC44-CD9C29AE2EAB}"/>
+              </a:ext>
+              <a:ext uri="{C183D7F6-B498-43B3-948B-1728B52AA6E4}">
+                <adec:decorative xmlns:adec="http://schemas.microsoft.com/office/drawing/2017/decorative" val="1"/>
+              </a:ext>
+            </a:extLst>
+          </p:cNvPr>
+          <p:cNvCxnSpPr>
+            <a:cxnSpLocks noGrp="1" noRot="1" noChangeAspect="1" noMove="1" noResize="1" noEditPoints="1" noAdjustHandles="1" noChangeArrowheads="1" noChangeShapeType="1"/>
+          </p:cNvCxnSpPr>
+          <p:nvPr>
+            <p:extLst>
+              <p:ext uri="{386F3935-93C4-4BCD-93E2-E3B085C9AB24}">
+                <p16:designElem xmlns:p16="http://schemas.microsoft.com/office/powerpoint/2015/main" val="1"/>
+              </p:ext>
+            </p:extLst>
+          </p:nvPr>
+        </p:nvCxnSpPr>
+        <p:spPr>
+          <a:xfrm>
+            <a:off x="952500" y="2871627"/>
+            <a:ext cx="0" cy="3186701"/>
+          </a:xfrm>
+          <a:prstGeom prst="line">
+            <a:avLst/>
+          </a:prstGeom>
+          <a:ln w="10795">
+            <a:solidFill>
+              <a:schemeClr val="tx2"/>
+            </a:solidFill>
+          </a:ln>
+        </p:spPr>
+        <p:style>
+          <a:lnRef idx="1">
+            <a:schemeClr val="accent1"/>
+          </a:lnRef>
+          <a:fillRef idx="0">
+            <a:schemeClr val="accent1"/>
+          </a:fillRef>
+          <a:effectRef idx="0">
+            <a:schemeClr val="accent1"/>
+          </a:effectRef>
+          <a:fontRef idx="minor">
+            <a:schemeClr val="tx1"/>
+          </a:fontRef>
+        </p:style>
+      </p:cxnSp>
+      <p:pic>
+        <p:nvPicPr>
+          <p:cNvPr id="7" name="Immagine 6">
+            <a:extLst>
+              <a:ext uri="{FF2B5EF4-FFF2-40B4-BE49-F238E27FC236}">
+                <a16:creationId xmlns:a16="http://schemas.microsoft.com/office/drawing/2014/main" id="{BCCEC2DF-6D72-B889-A1C8-56C55E15F7A6}"/>
+              </a:ext>
+            </a:extLst>
+          </p:cNvPr>
+          <p:cNvPicPr>
+            <a:picLocks noChangeAspect="1"/>
+          </p:cNvPicPr>
+          <p:nvPr/>
+        </p:nvPicPr>
+        <p:blipFill>
+          <a:blip r:embed="rId2"/>
+          <a:stretch>
+            <a:fillRect/>
+          </a:stretch>
+        </p:blipFill>
+        <p:spPr>
+          <a:xfrm>
+            <a:off x="2219324" y="1506033"/>
+            <a:ext cx="7753350" cy="5124450"/>
+          </a:xfrm>
+          <a:prstGeom prst="rect">
+            <a:avLst/>
+          </a:prstGeom>
+        </p:spPr>
+      </p:pic>
+      <p:sp>
+        <p:nvSpPr>
+          <p:cNvPr id="8" name="Rettangolo 7">
+            <a:extLst>
+              <a:ext uri="{FF2B5EF4-FFF2-40B4-BE49-F238E27FC236}">
+                <a16:creationId xmlns:a16="http://schemas.microsoft.com/office/drawing/2014/main" id="{2F576475-9DAF-0113-975A-981B9110244A}"/>
+              </a:ext>
+            </a:extLst>
+          </p:cNvPr>
+          <p:cNvSpPr/>
+          <p:nvPr/>
+        </p:nvSpPr>
+        <p:spPr>
+          <a:xfrm>
+            <a:off x="660400" y="2527300"/>
+            <a:ext cx="711200" cy="3683000"/>
+          </a:xfrm>
+          <a:prstGeom prst="rect">
+            <a:avLst/>
+          </a:prstGeom>
+          <a:solidFill>
+            <a:schemeClr val="bg2">
+              <a:lumMod val="75000"/>
+              <a:lumOff val="25000"/>
+            </a:schemeClr>
+          </a:solidFill>
+          <a:ln>
+            <a:solidFill>
+              <a:schemeClr val="bg2">
+                <a:lumMod val="75000"/>
+                <a:lumOff val="25000"/>
+              </a:schemeClr>
+            </a:solidFill>
+          </a:ln>
+        </p:spPr>
+        <p:style>
+          <a:lnRef idx="2">
+            <a:schemeClr val="accent1">
+              <a:shade val="15000"/>
+            </a:schemeClr>
+          </a:lnRef>
+          <a:fillRef idx="1">
+            <a:schemeClr val="accent1"/>
+          </a:fillRef>
+          <a:effectRef idx="0">
+            <a:schemeClr val="accent1"/>
+          </a:effectRef>
+          <a:fontRef idx="minor">
+            <a:schemeClr val="lt1"/>
+          </a:fontRef>
+        </p:style>
+        <p:txBody>
+          <a:bodyPr rtlCol="0" anchor="ctr"/>
+          <a:lstStyle/>
+          <a:p>
+            <a:pPr algn="ctr"/>
+            <a:endParaRPr lang="it-IT"/>
+          </a:p>
+        </p:txBody>
+      </p:sp>
+    </p:spTree>
+    <p:extLst>
+      <p:ext uri="{BB962C8B-B14F-4D97-AF65-F5344CB8AC3E}">
+        <p14:creationId xmlns:p14="http://schemas.microsoft.com/office/powerpoint/2010/main" val="2878792033"/>
       </p:ext>
     </p:extLst>
   </p:cSld>

</xml_diff>